<commit_message>
better label of BIC
</commit_message>
<xml_diff>
--- a/classes/stats2017/Lecture16.pptx
+++ b/classes/stats2017/Lecture16.pptx
@@ -249,7 +249,7 @@
             <a:fld id="{E5169B60-3AE0-4892-BDF6-E4160B08E8B2}" type="datetimeFigureOut">
               <a:rPr lang="en-US" smtClean="0"/>
               <a:pPr/>
-              <a:t>3/26/2016</a:t>
+              <a:t>3/17/2017</a:t>
             </a:fld>
             <a:endParaRPr lang="en-US"/>
           </a:p>
@@ -315,38 +315,37 @@
           <a:p>
             <a:pPr lvl="0"/>
             <a:r>
-              <a:rPr lang="en-US" smtClean="0"/>
+              <a:rPr lang="en-US"/>
               <a:t>Click to edit Master text styles</a:t>
             </a:r>
           </a:p>
           <a:p>
             <a:pPr lvl="1"/>
             <a:r>
-              <a:rPr lang="en-US" smtClean="0"/>
+              <a:rPr lang="en-US"/>
               <a:t>Second level</a:t>
             </a:r>
           </a:p>
           <a:p>
             <a:pPr lvl="2"/>
             <a:r>
-              <a:rPr lang="en-US" smtClean="0"/>
+              <a:rPr lang="en-US"/>
               <a:t>Third level</a:t>
             </a:r>
           </a:p>
           <a:p>
             <a:pPr lvl="3"/>
             <a:r>
-              <a:rPr lang="en-US" smtClean="0"/>
+              <a:rPr lang="en-US"/>
               <a:t>Fourth level</a:t>
             </a:r>
           </a:p>
           <a:p>
             <a:pPr lvl="4"/>
             <a:r>
-              <a:rPr lang="en-US" smtClean="0"/>
+              <a:rPr lang="en-US"/>
               <a:t>Fifth level</a:t>
             </a:r>
-            <a:endParaRPr lang="en-US"/>
           </a:p>
         </p:txBody>
       </p:sp>
@@ -694,6 +693,91 @@
 </p:notes>
 </file>
 
+<file path=ppt/notesSlides/notesSlide11.xml><?xml version="1.0" encoding="utf-8"?>
+<p:notes xmlns:a="http://schemas.openxmlformats.org/drawingml/2006/main" xmlns:r="http://schemas.openxmlformats.org/officeDocument/2006/relationships" xmlns:p="http://schemas.openxmlformats.org/presentationml/2006/main">
+  <p:cSld>
+    <p:spTree>
+      <p:nvGrpSpPr>
+        <p:cNvPr id="1" name=""/>
+        <p:cNvGrpSpPr/>
+        <p:nvPr/>
+      </p:nvGrpSpPr>
+      <p:grpSpPr>
+        <a:xfrm>
+          <a:off x="0" y="0"/>
+          <a:ext cx="0" cy="0"/>
+          <a:chOff x="0" y="0"/>
+          <a:chExt cx="0" cy="0"/>
+        </a:xfrm>
+      </p:grpSpPr>
+      <p:sp>
+        <p:nvSpPr>
+          <p:cNvPr id="2" name="Slide Image Placeholder 1"/>
+          <p:cNvSpPr>
+            <a:spLocks noGrp="1" noRot="1" noChangeAspect="1"/>
+          </p:cNvSpPr>
+          <p:nvPr>
+            <p:ph type="sldImg"/>
+          </p:nvPr>
+        </p:nvSpPr>
+        <p:spPr/>
+      </p:sp>
+      <p:sp>
+        <p:nvSpPr>
+          <p:cNvPr id="3" name="Notes Placeholder 2"/>
+          <p:cNvSpPr>
+            <a:spLocks noGrp="1"/>
+          </p:cNvSpPr>
+          <p:nvPr>
+            <p:ph type="body" idx="1"/>
+          </p:nvPr>
+        </p:nvSpPr>
+        <p:spPr/>
+        <p:txBody>
+          <a:bodyPr/>
+          <a:lstStyle/>
+          <a:p>
+            <a:endParaRPr lang="en-US" dirty="0"/>
+          </a:p>
+        </p:txBody>
+      </p:sp>
+      <p:sp>
+        <p:nvSpPr>
+          <p:cNvPr id="4" name="Slide Number Placeholder 3"/>
+          <p:cNvSpPr>
+            <a:spLocks noGrp="1"/>
+          </p:cNvSpPr>
+          <p:nvPr>
+            <p:ph type="sldNum" sz="quarter" idx="10"/>
+          </p:nvPr>
+        </p:nvSpPr>
+        <p:spPr/>
+        <p:txBody>
+          <a:bodyPr/>
+          <a:lstStyle/>
+          <a:p>
+            <a:fld id="{AABB8169-4E81-47E3-AD36-7DB28CAB46B7}" type="slidenum">
+              <a:rPr lang="en-US" smtClean="0"/>
+              <a:pPr/>
+              <a:t>39</a:t>
+            </a:fld>
+            <a:endParaRPr lang="en-US"/>
+          </a:p>
+        </p:txBody>
+      </p:sp>
+    </p:spTree>
+    <p:extLst>
+      <p:ext uri="{BB962C8B-B14F-4D97-AF65-F5344CB8AC3E}">
+        <p14:creationId xmlns:p14="http://schemas.microsoft.com/office/powerpoint/2010/main" val="2745863364"/>
+      </p:ext>
+    </p:extLst>
+  </p:cSld>
+  <p:clrMapOvr>
+    <a:masterClrMapping/>
+  </p:clrMapOvr>
+</p:notes>
+</file>
+
 <file path=ppt/notesSlides/notesSlide2.xml><?xml version="1.0" encoding="utf-8"?>
 <p:notes xmlns:a="http://schemas.openxmlformats.org/drawingml/2006/main" xmlns:r="http://schemas.openxmlformats.org/officeDocument/2006/relationships" xmlns:p="http://schemas.openxmlformats.org/presentationml/2006/main">
   <p:cSld>
@@ -1428,10 +1512,9 @@
           <a:lstStyle/>
           <a:p>
             <a:r>
-              <a:rPr lang="en-US" smtClean="0"/>
+              <a:rPr lang="en-US"/>
               <a:t>Click to edit Master title style</a:t>
             </a:r>
-            <a:endParaRPr lang="en-US"/>
           </a:p>
         </p:txBody>
       </p:sp>
@@ -1547,10 +1630,9 @@
           </a:lstStyle>
           <a:p>
             <a:r>
-              <a:rPr lang="en-US" smtClean="0"/>
+              <a:rPr lang="en-US"/>
               <a:t>Click to edit Master subtitle style</a:t>
             </a:r>
-            <a:endParaRPr lang="en-US"/>
           </a:p>
         </p:txBody>
       </p:sp>
@@ -1572,7 +1654,7 @@
             <a:fld id="{1D8BD707-D9CF-40AE-B4C6-C98DA3205C09}" type="datetimeFigureOut">
               <a:rPr lang="en-US" smtClean="0"/>
               <a:pPr/>
-              <a:t>3/26/2016</a:t>
+              <a:t>3/17/2017</a:t>
             </a:fld>
             <a:endParaRPr lang="en-US"/>
           </a:p>
@@ -1662,10 +1744,9 @@
           <a:lstStyle/>
           <a:p>
             <a:r>
-              <a:rPr lang="en-US" smtClean="0"/>
+              <a:rPr lang="en-US"/>
               <a:t>Click to edit Master title style</a:t>
             </a:r>
-            <a:endParaRPr lang="en-US"/>
           </a:p>
         </p:txBody>
       </p:sp>
@@ -1686,38 +1767,37 @@
           <a:p>
             <a:pPr lvl="0"/>
             <a:r>
-              <a:rPr lang="en-US" smtClean="0"/>
+              <a:rPr lang="en-US"/>
               <a:t>Click to edit Master text styles</a:t>
             </a:r>
           </a:p>
           <a:p>
             <a:pPr lvl="1"/>
             <a:r>
-              <a:rPr lang="en-US" smtClean="0"/>
+              <a:rPr lang="en-US"/>
               <a:t>Second level</a:t>
             </a:r>
           </a:p>
           <a:p>
             <a:pPr lvl="2"/>
             <a:r>
-              <a:rPr lang="en-US" smtClean="0"/>
+              <a:rPr lang="en-US"/>
               <a:t>Third level</a:t>
             </a:r>
           </a:p>
           <a:p>
             <a:pPr lvl="3"/>
             <a:r>
-              <a:rPr lang="en-US" smtClean="0"/>
+              <a:rPr lang="en-US"/>
               <a:t>Fourth level</a:t>
             </a:r>
           </a:p>
           <a:p>
             <a:pPr lvl="4"/>
             <a:r>
-              <a:rPr lang="en-US" smtClean="0"/>
+              <a:rPr lang="en-US"/>
               <a:t>Fifth level</a:t>
             </a:r>
-            <a:endParaRPr lang="en-US"/>
           </a:p>
         </p:txBody>
       </p:sp>
@@ -1739,7 +1819,7 @@
             <a:fld id="{1D8BD707-D9CF-40AE-B4C6-C98DA3205C09}" type="datetimeFigureOut">
               <a:rPr lang="en-US" smtClean="0"/>
               <a:pPr/>
-              <a:t>3/26/2016</a:t>
+              <a:t>3/17/2017</a:t>
             </a:fld>
             <a:endParaRPr lang="en-US"/>
           </a:p>
@@ -1834,10 +1914,9 @@
           <a:lstStyle/>
           <a:p>
             <a:r>
-              <a:rPr lang="en-US" smtClean="0"/>
+              <a:rPr lang="en-US"/>
               <a:t>Click to edit Master title style</a:t>
             </a:r>
-            <a:endParaRPr lang="en-US"/>
           </a:p>
         </p:txBody>
       </p:sp>
@@ -1863,38 +1942,37 @@
           <a:p>
             <a:pPr lvl="0"/>
             <a:r>
-              <a:rPr lang="en-US" smtClean="0"/>
+              <a:rPr lang="en-US"/>
               <a:t>Click to edit Master text styles</a:t>
             </a:r>
           </a:p>
           <a:p>
             <a:pPr lvl="1"/>
             <a:r>
-              <a:rPr lang="en-US" smtClean="0"/>
+              <a:rPr lang="en-US"/>
               <a:t>Second level</a:t>
             </a:r>
           </a:p>
           <a:p>
             <a:pPr lvl="2"/>
             <a:r>
-              <a:rPr lang="en-US" smtClean="0"/>
+              <a:rPr lang="en-US"/>
               <a:t>Third level</a:t>
             </a:r>
           </a:p>
           <a:p>
             <a:pPr lvl="3"/>
             <a:r>
-              <a:rPr lang="en-US" smtClean="0"/>
+              <a:rPr lang="en-US"/>
               <a:t>Fourth level</a:t>
             </a:r>
           </a:p>
           <a:p>
             <a:pPr lvl="4"/>
             <a:r>
-              <a:rPr lang="en-US" smtClean="0"/>
+              <a:rPr lang="en-US"/>
               <a:t>Fifth level</a:t>
             </a:r>
-            <a:endParaRPr lang="en-US"/>
           </a:p>
         </p:txBody>
       </p:sp>
@@ -1916,7 +1994,7 @@
             <a:fld id="{1D8BD707-D9CF-40AE-B4C6-C98DA3205C09}" type="datetimeFigureOut">
               <a:rPr lang="en-US" smtClean="0"/>
               <a:pPr/>
-              <a:t>3/26/2016</a:t>
+              <a:t>3/17/2017</a:t>
             </a:fld>
             <a:endParaRPr lang="en-US"/>
           </a:p>
@@ -2006,10 +2084,9 @@
           <a:lstStyle/>
           <a:p>
             <a:r>
-              <a:rPr lang="en-US" smtClean="0"/>
+              <a:rPr lang="en-US"/>
               <a:t>Click to edit Master title style</a:t>
             </a:r>
-            <a:endParaRPr lang="en-US"/>
           </a:p>
         </p:txBody>
       </p:sp>
@@ -2030,38 +2107,37 @@
           <a:p>
             <a:pPr lvl="0"/>
             <a:r>
-              <a:rPr lang="en-US" smtClean="0"/>
+              <a:rPr lang="en-US"/>
               <a:t>Click to edit Master text styles</a:t>
             </a:r>
           </a:p>
           <a:p>
             <a:pPr lvl="1"/>
             <a:r>
-              <a:rPr lang="en-US" smtClean="0"/>
+              <a:rPr lang="en-US"/>
               <a:t>Second level</a:t>
             </a:r>
           </a:p>
           <a:p>
             <a:pPr lvl="2"/>
             <a:r>
-              <a:rPr lang="en-US" smtClean="0"/>
+              <a:rPr lang="en-US"/>
               <a:t>Third level</a:t>
             </a:r>
           </a:p>
           <a:p>
             <a:pPr lvl="3"/>
             <a:r>
-              <a:rPr lang="en-US" smtClean="0"/>
+              <a:rPr lang="en-US"/>
               <a:t>Fourth level</a:t>
             </a:r>
           </a:p>
           <a:p>
             <a:pPr lvl="4"/>
             <a:r>
-              <a:rPr lang="en-US" smtClean="0"/>
+              <a:rPr lang="en-US"/>
               <a:t>Fifth level</a:t>
             </a:r>
-            <a:endParaRPr lang="en-US"/>
           </a:p>
         </p:txBody>
       </p:sp>
@@ -2083,7 +2159,7 @@
             <a:fld id="{1D8BD707-D9CF-40AE-B4C6-C98DA3205C09}" type="datetimeFigureOut">
               <a:rPr lang="en-US" smtClean="0"/>
               <a:pPr/>
-              <a:t>3/26/2016</a:t>
+              <a:t>3/17/2017</a:t>
             </a:fld>
             <a:endParaRPr lang="en-US"/>
           </a:p>
@@ -2182,10 +2258,9 @@
           </a:lstStyle>
           <a:p>
             <a:r>
-              <a:rPr lang="en-US" smtClean="0"/>
+              <a:rPr lang="en-US"/>
               <a:t>Click to edit Master title style</a:t>
             </a:r>
-            <a:endParaRPr lang="en-US"/>
           </a:p>
         </p:txBody>
       </p:sp>
@@ -2302,7 +2377,7 @@
           <a:p>
             <a:pPr lvl="0"/>
             <a:r>
-              <a:rPr lang="en-US" smtClean="0"/>
+              <a:rPr lang="en-US"/>
               <a:t>Click to edit Master text styles</a:t>
             </a:r>
           </a:p>
@@ -2326,7 +2401,7 @@
             <a:fld id="{1D8BD707-D9CF-40AE-B4C6-C98DA3205C09}" type="datetimeFigureOut">
               <a:rPr lang="en-US" smtClean="0"/>
               <a:pPr/>
-              <a:t>3/26/2016</a:t>
+              <a:t>3/17/2017</a:t>
             </a:fld>
             <a:endParaRPr lang="en-US"/>
           </a:p>
@@ -2416,10 +2491,9 @@
           <a:lstStyle/>
           <a:p>
             <a:r>
-              <a:rPr lang="en-US" smtClean="0"/>
+              <a:rPr lang="en-US"/>
               <a:t>Click to edit Master title style</a:t>
             </a:r>
-            <a:endParaRPr lang="en-US"/>
           </a:p>
         </p:txBody>
       </p:sp>
@@ -2473,38 +2547,37 @@
           <a:p>
             <a:pPr lvl="0"/>
             <a:r>
-              <a:rPr lang="en-US" smtClean="0"/>
+              <a:rPr lang="en-US"/>
               <a:t>Click to edit Master text styles</a:t>
             </a:r>
           </a:p>
           <a:p>
             <a:pPr lvl="1"/>
             <a:r>
-              <a:rPr lang="en-US" smtClean="0"/>
+              <a:rPr lang="en-US"/>
               <a:t>Second level</a:t>
             </a:r>
           </a:p>
           <a:p>
             <a:pPr lvl="2"/>
             <a:r>
-              <a:rPr lang="en-US" smtClean="0"/>
+              <a:rPr lang="en-US"/>
               <a:t>Third level</a:t>
             </a:r>
           </a:p>
           <a:p>
             <a:pPr lvl="3"/>
             <a:r>
-              <a:rPr lang="en-US" smtClean="0"/>
+              <a:rPr lang="en-US"/>
               <a:t>Fourth level</a:t>
             </a:r>
           </a:p>
           <a:p>
             <a:pPr lvl="4"/>
             <a:r>
-              <a:rPr lang="en-US" smtClean="0"/>
+              <a:rPr lang="en-US"/>
               <a:t>Fifth level</a:t>
             </a:r>
-            <a:endParaRPr lang="en-US"/>
           </a:p>
         </p:txBody>
       </p:sp>
@@ -2558,38 +2631,37 @@
           <a:p>
             <a:pPr lvl="0"/>
             <a:r>
-              <a:rPr lang="en-US" smtClean="0"/>
+              <a:rPr lang="en-US"/>
               <a:t>Click to edit Master text styles</a:t>
             </a:r>
           </a:p>
           <a:p>
             <a:pPr lvl="1"/>
             <a:r>
-              <a:rPr lang="en-US" smtClean="0"/>
+              <a:rPr lang="en-US"/>
               <a:t>Second level</a:t>
             </a:r>
           </a:p>
           <a:p>
             <a:pPr lvl="2"/>
             <a:r>
-              <a:rPr lang="en-US" smtClean="0"/>
+              <a:rPr lang="en-US"/>
               <a:t>Third level</a:t>
             </a:r>
           </a:p>
           <a:p>
             <a:pPr lvl="3"/>
             <a:r>
-              <a:rPr lang="en-US" smtClean="0"/>
+              <a:rPr lang="en-US"/>
               <a:t>Fourth level</a:t>
             </a:r>
           </a:p>
           <a:p>
             <a:pPr lvl="4"/>
             <a:r>
-              <a:rPr lang="en-US" smtClean="0"/>
+              <a:rPr lang="en-US"/>
               <a:t>Fifth level</a:t>
             </a:r>
-            <a:endParaRPr lang="en-US"/>
           </a:p>
         </p:txBody>
       </p:sp>
@@ -2611,7 +2683,7 @@
             <a:fld id="{1D8BD707-D9CF-40AE-B4C6-C98DA3205C09}" type="datetimeFigureOut">
               <a:rPr lang="en-US" smtClean="0"/>
               <a:pPr/>
-              <a:t>3/26/2016</a:t>
+              <a:t>3/17/2017</a:t>
             </a:fld>
             <a:endParaRPr lang="en-US"/>
           </a:p>
@@ -2705,10 +2777,9 @@
           </a:lstStyle>
           <a:p>
             <a:r>
-              <a:rPr lang="en-US" smtClean="0"/>
+              <a:rPr lang="en-US"/>
               <a:t>Click to edit Master title style</a:t>
             </a:r>
-            <a:endParaRPr lang="en-US"/>
           </a:p>
         </p:txBody>
       </p:sp>
@@ -2771,7 +2842,7 @@
           <a:p>
             <a:pPr lvl="0"/>
             <a:r>
-              <a:rPr lang="en-US" smtClean="0"/>
+              <a:rPr lang="en-US"/>
               <a:t>Click to edit Master text styles</a:t>
             </a:r>
           </a:p>
@@ -2827,38 +2898,37 @@
           <a:p>
             <a:pPr lvl="0"/>
             <a:r>
-              <a:rPr lang="en-US" smtClean="0"/>
+              <a:rPr lang="en-US"/>
               <a:t>Click to edit Master text styles</a:t>
             </a:r>
           </a:p>
           <a:p>
             <a:pPr lvl="1"/>
             <a:r>
-              <a:rPr lang="en-US" smtClean="0"/>
+              <a:rPr lang="en-US"/>
               <a:t>Second level</a:t>
             </a:r>
           </a:p>
           <a:p>
             <a:pPr lvl="2"/>
             <a:r>
-              <a:rPr lang="en-US" smtClean="0"/>
+              <a:rPr lang="en-US"/>
               <a:t>Third level</a:t>
             </a:r>
           </a:p>
           <a:p>
             <a:pPr lvl="3"/>
             <a:r>
-              <a:rPr lang="en-US" smtClean="0"/>
+              <a:rPr lang="en-US"/>
               <a:t>Fourth level</a:t>
             </a:r>
           </a:p>
           <a:p>
             <a:pPr lvl="4"/>
             <a:r>
-              <a:rPr lang="en-US" smtClean="0"/>
+              <a:rPr lang="en-US"/>
               <a:t>Fifth level</a:t>
             </a:r>
-            <a:endParaRPr lang="en-US"/>
           </a:p>
         </p:txBody>
       </p:sp>
@@ -2921,7 +2991,7 @@
           <a:p>
             <a:pPr lvl="0"/>
             <a:r>
-              <a:rPr lang="en-US" smtClean="0"/>
+              <a:rPr lang="en-US"/>
               <a:t>Click to edit Master text styles</a:t>
             </a:r>
           </a:p>
@@ -2977,38 +3047,37 @@
           <a:p>
             <a:pPr lvl="0"/>
             <a:r>
-              <a:rPr lang="en-US" smtClean="0"/>
+              <a:rPr lang="en-US"/>
               <a:t>Click to edit Master text styles</a:t>
             </a:r>
           </a:p>
           <a:p>
             <a:pPr lvl="1"/>
             <a:r>
-              <a:rPr lang="en-US" smtClean="0"/>
+              <a:rPr lang="en-US"/>
               <a:t>Second level</a:t>
             </a:r>
           </a:p>
           <a:p>
             <a:pPr lvl="2"/>
             <a:r>
-              <a:rPr lang="en-US" smtClean="0"/>
+              <a:rPr lang="en-US"/>
               <a:t>Third level</a:t>
             </a:r>
           </a:p>
           <a:p>
             <a:pPr lvl="3"/>
             <a:r>
-              <a:rPr lang="en-US" smtClean="0"/>
+              <a:rPr lang="en-US"/>
               <a:t>Fourth level</a:t>
             </a:r>
           </a:p>
           <a:p>
             <a:pPr lvl="4"/>
             <a:r>
-              <a:rPr lang="en-US" smtClean="0"/>
+              <a:rPr lang="en-US"/>
               <a:t>Fifth level</a:t>
             </a:r>
-            <a:endParaRPr lang="en-US"/>
           </a:p>
         </p:txBody>
       </p:sp>
@@ -3030,7 +3099,7 @@
             <a:fld id="{1D8BD707-D9CF-40AE-B4C6-C98DA3205C09}" type="datetimeFigureOut">
               <a:rPr lang="en-US" smtClean="0"/>
               <a:pPr/>
-              <a:t>3/26/2016</a:t>
+              <a:t>3/17/2017</a:t>
             </a:fld>
             <a:endParaRPr lang="en-US"/>
           </a:p>
@@ -3120,10 +3189,9 @@
           <a:lstStyle/>
           <a:p>
             <a:r>
-              <a:rPr lang="en-US" smtClean="0"/>
+              <a:rPr lang="en-US"/>
               <a:t>Click to edit Master title style</a:t>
             </a:r>
-            <a:endParaRPr lang="en-US"/>
           </a:p>
         </p:txBody>
       </p:sp>
@@ -3145,7 +3213,7 @@
             <a:fld id="{1D8BD707-D9CF-40AE-B4C6-C98DA3205C09}" type="datetimeFigureOut">
               <a:rPr lang="en-US" smtClean="0"/>
               <a:pPr/>
-              <a:t>3/26/2016</a:t>
+              <a:t>3/17/2017</a:t>
             </a:fld>
             <a:endParaRPr lang="en-US"/>
           </a:p>
@@ -3237,7 +3305,7 @@
             <a:fld id="{1D8BD707-D9CF-40AE-B4C6-C98DA3205C09}" type="datetimeFigureOut">
               <a:rPr lang="en-US" smtClean="0"/>
               <a:pPr/>
-              <a:t>3/26/2016</a:t>
+              <a:t>3/17/2017</a:t>
             </a:fld>
             <a:endParaRPr lang="en-US"/>
           </a:p>
@@ -3336,10 +3404,9 @@
           </a:lstStyle>
           <a:p>
             <a:r>
-              <a:rPr lang="en-US" smtClean="0"/>
+              <a:rPr lang="en-US"/>
               <a:t>Click to edit Master title style</a:t>
             </a:r>
-            <a:endParaRPr lang="en-US"/>
           </a:p>
         </p:txBody>
       </p:sp>
@@ -3393,38 +3460,37 @@
           <a:p>
             <a:pPr lvl="0"/>
             <a:r>
-              <a:rPr lang="en-US" smtClean="0"/>
+              <a:rPr lang="en-US"/>
               <a:t>Click to edit Master text styles</a:t>
             </a:r>
           </a:p>
           <a:p>
             <a:pPr lvl="1"/>
             <a:r>
-              <a:rPr lang="en-US" smtClean="0"/>
+              <a:rPr lang="en-US"/>
               <a:t>Second level</a:t>
             </a:r>
           </a:p>
           <a:p>
             <a:pPr lvl="2"/>
             <a:r>
-              <a:rPr lang="en-US" smtClean="0"/>
+              <a:rPr lang="en-US"/>
               <a:t>Third level</a:t>
             </a:r>
           </a:p>
           <a:p>
             <a:pPr lvl="3"/>
             <a:r>
-              <a:rPr lang="en-US" smtClean="0"/>
+              <a:rPr lang="en-US"/>
               <a:t>Fourth level</a:t>
             </a:r>
           </a:p>
           <a:p>
             <a:pPr lvl="4"/>
             <a:r>
-              <a:rPr lang="en-US" smtClean="0"/>
+              <a:rPr lang="en-US"/>
               <a:t>Fifth level</a:t>
             </a:r>
-            <a:endParaRPr lang="en-US"/>
           </a:p>
         </p:txBody>
       </p:sp>
@@ -3487,7 +3553,7 @@
           <a:p>
             <a:pPr lvl="0"/>
             <a:r>
-              <a:rPr lang="en-US" smtClean="0"/>
+              <a:rPr lang="en-US"/>
               <a:t>Click to edit Master text styles</a:t>
             </a:r>
           </a:p>
@@ -3511,7 +3577,7 @@
             <a:fld id="{1D8BD707-D9CF-40AE-B4C6-C98DA3205C09}" type="datetimeFigureOut">
               <a:rPr lang="en-US" smtClean="0"/>
               <a:pPr/>
-              <a:t>3/26/2016</a:t>
+              <a:t>3/17/2017</a:t>
             </a:fld>
             <a:endParaRPr lang="en-US"/>
           </a:p>
@@ -3610,10 +3676,9 @@
           </a:lstStyle>
           <a:p>
             <a:r>
-              <a:rPr lang="en-US" smtClean="0"/>
+              <a:rPr lang="en-US"/>
               <a:t>Click to edit Master title style</a:t>
             </a:r>
-            <a:endParaRPr lang="en-US"/>
           </a:p>
         </p:txBody>
       </p:sp>
@@ -3737,7 +3802,7 @@
           <a:p>
             <a:pPr lvl="0"/>
             <a:r>
-              <a:rPr lang="en-US" smtClean="0"/>
+              <a:rPr lang="en-US"/>
               <a:t>Click to edit Master text styles</a:t>
             </a:r>
           </a:p>
@@ -3761,7 +3826,7 @@
             <a:fld id="{1D8BD707-D9CF-40AE-B4C6-C98DA3205C09}" type="datetimeFigureOut">
               <a:rPr lang="en-US" smtClean="0"/>
               <a:pPr/>
-              <a:t>3/26/2016</a:t>
+              <a:t>3/17/2017</a:t>
             </a:fld>
             <a:endParaRPr lang="en-US"/>
           </a:p>
@@ -3866,10 +3931,9 @@
           <a:lstStyle/>
           <a:p>
             <a:r>
-              <a:rPr lang="en-US" smtClean="0"/>
+              <a:rPr lang="en-US"/>
               <a:t>Click to edit Master title style</a:t>
             </a:r>
-            <a:endParaRPr lang="en-US"/>
           </a:p>
         </p:txBody>
       </p:sp>
@@ -3900,38 +3964,37 @@
           <a:p>
             <a:pPr lvl="0"/>
             <a:r>
-              <a:rPr lang="en-US" smtClean="0"/>
+              <a:rPr lang="en-US"/>
               <a:t>Click to edit Master text styles</a:t>
             </a:r>
           </a:p>
           <a:p>
             <a:pPr lvl="1"/>
             <a:r>
-              <a:rPr lang="en-US" smtClean="0"/>
+              <a:rPr lang="en-US"/>
               <a:t>Second level</a:t>
             </a:r>
           </a:p>
           <a:p>
             <a:pPr lvl="2"/>
             <a:r>
-              <a:rPr lang="en-US" smtClean="0"/>
+              <a:rPr lang="en-US"/>
               <a:t>Third level</a:t>
             </a:r>
           </a:p>
           <a:p>
             <a:pPr lvl="3"/>
             <a:r>
-              <a:rPr lang="en-US" smtClean="0"/>
+              <a:rPr lang="en-US"/>
               <a:t>Fourth level</a:t>
             </a:r>
           </a:p>
           <a:p>
             <a:pPr lvl="4"/>
             <a:r>
-              <a:rPr lang="en-US" smtClean="0"/>
+              <a:rPr lang="en-US"/>
               <a:t>Fifth level</a:t>
             </a:r>
-            <a:endParaRPr lang="en-US"/>
           </a:p>
         </p:txBody>
       </p:sp>
@@ -3971,7 +4034,7 @@
             <a:fld id="{1D8BD707-D9CF-40AE-B4C6-C98DA3205C09}" type="datetimeFigureOut">
               <a:rPr lang="en-US" smtClean="0"/>
               <a:pPr/>
-              <a:t>3/26/2016</a:t>
+              <a:t>3/17/2017</a:t>
             </a:fld>
             <a:endParaRPr lang="en-US"/>
           </a:p>
@@ -4365,22 +4428,21 @@
           <a:lstStyle/>
           <a:p>
             <a:r>
-              <a:rPr lang="en-US" dirty="0" smtClean="0"/>
+              <a:rPr lang="en-US" dirty="0"/>
               <a:t>Calculating the likelihood of models</a:t>
             </a:r>
           </a:p>
           <a:p>
             <a:r>
-              <a:rPr lang="en-US" dirty="0" smtClean="0"/>
+              <a:rPr lang="en-US" dirty="0"/>
               <a:t>Linear models with higher exponential terms</a:t>
             </a:r>
           </a:p>
           <a:p>
             <a:r>
-              <a:rPr lang="en-US" dirty="0" smtClean="0"/>
+              <a:rPr lang="en-US" dirty="0"/>
               <a:t>AIC criteria</a:t>
             </a:r>
-            <a:endParaRPr lang="en-US" dirty="0"/>
           </a:p>
         </p:txBody>
       </p:sp>
@@ -4422,13 +4484,6 @@
   <p:clrMapOvr>
     <a:masterClrMapping/>
   </p:clrMapOvr>
-  <p:timing>
-    <p:tnLst>
-      <p:par>
-        <p:cTn id="1" dur="indefinite" restart="never" nodeType="tmRoot"/>
-      </p:par>
-    </p:tnLst>
-  </p:timing>
 </p:sld>
 </file>
 
@@ -4600,16 +4655,15 @@
           <a:lstStyle/>
           <a:p>
             <a:r>
-              <a:rPr lang="en-US" dirty="0" smtClean="0"/>
+              <a:rPr lang="en-US" dirty="0"/>
               <a:t>Although we could justify </a:t>
             </a:r>
           </a:p>
           <a:p>
             <a:r>
-              <a:rPr lang="en-US" dirty="0" smtClean="0"/>
+              <a:rPr lang="en-US" dirty="0"/>
               <a:t>Pushing ahead with our linear model</a:t>
             </a:r>
-            <a:endParaRPr lang="en-US" dirty="0"/>
           </a:p>
         </p:txBody>
       </p:sp>
@@ -4636,10 +4690,9 @@
           <a:lstStyle/>
           <a:p>
             <a:r>
-              <a:rPr lang="en-US" dirty="0" smtClean="0"/>
+              <a:rPr lang="en-US" dirty="0"/>
               <a:t>We see systematic deviation from the assumption of linearity…</a:t>
             </a:r>
-            <a:endParaRPr lang="en-US" dirty="0"/>
           </a:p>
         </p:txBody>
       </p:sp>
@@ -4648,13 +4701,6 @@
   <p:clrMapOvr>
     <a:masterClrMapping/>
   </p:clrMapOvr>
-  <p:timing>
-    <p:tnLst>
-      <p:par>
-        <p:cTn id="1" dur="indefinite" restart="never" nodeType="tmRoot"/>
-      </p:par>
-    </p:tnLst>
-  </p:timing>
 </p:sld>
 </file>
 
@@ -4698,10 +4744,9 @@
           <a:lstStyle/>
           <a:p>
             <a:r>
-              <a:rPr lang="en-US" dirty="0" smtClean="0"/>
+              <a:rPr lang="en-US" dirty="0"/>
               <a:t>One alternative is just to accept the deviation from linearity..</a:t>
             </a:r>
-            <a:endParaRPr lang="en-US" dirty="0"/>
           </a:p>
         </p:txBody>
       </p:sp>
@@ -4793,16 +4838,15 @@
           <a:lstStyle/>
           <a:p>
             <a:r>
-              <a:rPr lang="en-US" dirty="0" smtClean="0"/>
+              <a:rPr lang="en-US" dirty="0"/>
               <a:t>As before we can remove</a:t>
             </a:r>
           </a:p>
           <a:p>
             <a:r>
-              <a:rPr lang="en-US" dirty="0" smtClean="0"/>
+              <a:rPr lang="en-US" dirty="0"/>
               <a:t>the interaction terms</a:t>
             </a:r>
-            <a:endParaRPr lang="en-US" dirty="0"/>
           </a:p>
         </p:txBody>
       </p:sp>
@@ -4811,13 +4855,6 @@
   <p:clrMapOvr>
     <a:masterClrMapping/>
   </p:clrMapOvr>
-  <p:timing>
-    <p:tnLst>
-      <p:par>
-        <p:cTn id="1" dur="indefinite" restart="never" nodeType="tmRoot"/>
-      </p:par>
-    </p:tnLst>
-  </p:timing>
 </p:sld>
 </file>
 
@@ -4989,10 +5026,9 @@
           <a:lstStyle/>
           <a:p>
             <a:r>
-              <a:rPr lang="en-US" dirty="0" smtClean="0"/>
+              <a:rPr lang="en-US" dirty="0"/>
               <a:t>Our 5 parameter model does not appear to deviate substantially from its assumptions…</a:t>
             </a:r>
-            <a:endParaRPr lang="en-US" dirty="0"/>
           </a:p>
         </p:txBody>
       </p:sp>
@@ -5001,13 +5037,6 @@
   <p:clrMapOvr>
     <a:masterClrMapping/>
   </p:clrMapOvr>
-  <p:timing>
-    <p:tnLst>
-      <p:par>
-        <p:cTn id="1" dur="indefinite" restart="never" nodeType="tmRoot"/>
-      </p:par>
-    </p:tnLst>
-  </p:timing>
 </p:sld>
 </file>
 
@@ -5083,16 +5112,15 @@
           <a:lstStyle/>
           <a:p>
             <a:r>
-              <a:rPr lang="en-US" dirty="0" smtClean="0"/>
+              <a:rPr lang="en-US" dirty="0"/>
               <a:t>Treatment with antibiotic appears to be significantly associated with decreased amounts of</a:t>
             </a:r>
           </a:p>
           <a:p>
             <a:r>
-              <a:rPr lang="en-US" dirty="0" smtClean="0"/>
+              <a:rPr lang="en-US" dirty="0"/>
               <a:t>this bug….</a:t>
             </a:r>
-            <a:endParaRPr lang="en-US" dirty="0"/>
           </a:p>
         </p:txBody>
       </p:sp>
@@ -5101,13 +5129,6 @@
   <p:clrMapOvr>
     <a:masterClrMapping/>
   </p:clrMapOvr>
-  <p:timing>
-    <p:tnLst>
-      <p:par>
-        <p:cTn id="1" dur="indefinite" restart="never" nodeType="tmRoot"/>
-      </p:par>
-    </p:tnLst>
-  </p:timing>
 </p:sld>
 </file>
 
@@ -5215,10 +5236,9 @@
           <a:lstStyle/>
           <a:p>
             <a:r>
-              <a:rPr lang="en-US" dirty="0" smtClean="0"/>
+              <a:rPr lang="en-US" dirty="0"/>
               <a:t>The model is in the ballpark (but is not really linear)</a:t>
             </a:r>
-            <a:endParaRPr lang="en-US" dirty="0"/>
           </a:p>
         </p:txBody>
       </p:sp>
@@ -5227,13 +5247,6 @@
   <p:clrMapOvr>
     <a:masterClrMapping/>
   </p:clrMapOvr>
-  <p:timing>
-    <p:tnLst>
-      <p:par>
-        <p:cTn id="1" dur="indefinite" restart="never" nodeType="tmRoot"/>
-      </p:par>
-    </p:tnLst>
-  </p:timing>
 </p:sld>
 </file>
 
@@ -5277,10 +5290,9 @@
           <a:lstStyle/>
           <a:p>
             <a:r>
-              <a:rPr lang="en-US" dirty="0" smtClean="0"/>
+              <a:rPr lang="en-US" dirty="0"/>
               <a:t>Another alternative..  Add additional parameters to the model… </a:t>
             </a:r>
-            <a:endParaRPr lang="en-US" dirty="0"/>
           </a:p>
         </p:txBody>
       </p:sp>
@@ -5371,52 +5383,52 @@
           <a:lstStyle/>
           <a:p>
             <a:r>
-              <a:rPr lang="en-US" sz="1400" dirty="0" smtClean="0"/>
+              <a:rPr lang="en-US" sz="1400" dirty="0"/>
               <a:t>Here is a 12 parameter</a:t>
             </a:r>
           </a:p>
           <a:p>
             <a:r>
-              <a:rPr lang="en-US" sz="1400" dirty="0" smtClean="0"/>
+              <a:rPr lang="en-US" sz="1400" dirty="0"/>
               <a:t>model…</a:t>
             </a:r>
           </a:p>
           <a:p>
-            <a:endParaRPr lang="en-US" sz="1400" dirty="0" smtClean="0"/>
-          </a:p>
-          <a:p>
-            <a:r>
-              <a:rPr lang="en-US" sz="1400" dirty="0" smtClean="0"/>
+            <a:endParaRPr lang="en-US" sz="1400" dirty="0"/>
+          </a:p>
+          <a:p>
+            <a:r>
+              <a:rPr lang="en-US" sz="1400" dirty="0"/>
               <a:t>B0 + </a:t>
             </a:r>
           </a:p>
           <a:p>
             <a:r>
-              <a:rPr lang="en-US" sz="1400" dirty="0" smtClean="0"/>
+              <a:rPr lang="en-US" sz="1400" dirty="0"/>
               <a:t>B1 * time + </a:t>
             </a:r>
           </a:p>
           <a:p>
             <a:r>
-              <a:rPr lang="en-US" sz="1400" dirty="0" smtClean="0"/>
+              <a:rPr lang="en-US" sz="1400" dirty="0"/>
               <a:t>B2 * time^2 + </a:t>
             </a:r>
           </a:p>
           <a:p>
             <a:r>
-              <a:rPr lang="en-US" sz="1400" dirty="0" smtClean="0"/>
+              <a:rPr lang="en-US" sz="1400" dirty="0"/>
               <a:t>3 dummy parameters for intercept + </a:t>
             </a:r>
           </a:p>
           <a:p>
             <a:r>
-              <a:rPr lang="en-US" sz="1400" dirty="0" smtClean="0"/>
+              <a:rPr lang="en-US" sz="1400" dirty="0"/>
               <a:t>3 dummy parameters *time + </a:t>
             </a:r>
           </a:p>
           <a:p>
             <a:r>
-              <a:rPr lang="en-US" sz="1400" dirty="0" smtClean="0"/>
+              <a:rPr lang="en-US" sz="1400" dirty="0"/>
               <a:t>3 dummy parameters * Time ^2</a:t>
             </a:r>
           </a:p>
@@ -5527,13 +5539,6 @@
   <p:clrMapOvr>
     <a:masterClrMapping/>
   </p:clrMapOvr>
-  <p:timing>
-    <p:tnLst>
-      <p:par>
-        <p:cTn id="1" dur="indefinite" restart="never" nodeType="tmRoot"/>
-      </p:par>
-    </p:tnLst>
-  </p:timing>
 </p:sld>
 </file>
 
@@ -5577,16 +5582,15 @@
           <a:lstStyle/>
           <a:p>
             <a:r>
-              <a:rPr lang="en-US" dirty="0" smtClean="0"/>
+              <a:rPr lang="en-US" dirty="0"/>
               <a:t>One problem, days and days^2 are highly correlated.</a:t>
             </a:r>
           </a:p>
           <a:p>
             <a:r>
-              <a:rPr lang="en-US" dirty="0" smtClean="0"/>
+              <a:rPr lang="en-US" dirty="0"/>
               <a:t>Correlated inputs will cause numerical instability in the model!</a:t>
             </a:r>
-            <a:endParaRPr lang="en-US" dirty="0"/>
           </a:p>
         </p:txBody>
       </p:sp>
@@ -5677,49 +5681,48 @@
           <a:lstStyle/>
           <a:p>
             <a:r>
-              <a:rPr lang="en-US" dirty="0" smtClean="0"/>
+              <a:rPr lang="en-US" dirty="0"/>
               <a:t>You can double one </a:t>
             </a:r>
           </a:p>
           <a:p>
             <a:r>
-              <a:rPr lang="en-US" dirty="0" smtClean="0"/>
+              <a:rPr lang="en-US" dirty="0"/>
               <a:t>parameter and compensate</a:t>
             </a:r>
           </a:p>
           <a:p>
             <a:r>
-              <a:rPr lang="en-US" dirty="0" smtClean="0"/>
+              <a:rPr lang="en-US" dirty="0"/>
               <a:t>by halving another…</a:t>
             </a:r>
           </a:p>
           <a:p>
-            <a:endParaRPr lang="en-US" dirty="0" smtClean="0"/>
-          </a:p>
-          <a:p>
-            <a:r>
-              <a:rPr lang="en-US" dirty="0" smtClean="0"/>
+            <a:endParaRPr lang="en-US" dirty="0"/>
+          </a:p>
+          <a:p>
+            <a:r>
+              <a:rPr lang="en-US" dirty="0"/>
               <a:t>With correlated input data,</a:t>
             </a:r>
           </a:p>
           <a:p>
             <a:r>
-              <a:rPr lang="en-US" dirty="0" smtClean="0"/>
+              <a:rPr lang="en-US" dirty="0"/>
               <a:t>there are an infinite number</a:t>
             </a:r>
           </a:p>
           <a:p>
             <a:r>
-              <a:rPr lang="en-US" dirty="0" smtClean="0"/>
+              <a:rPr lang="en-US" dirty="0"/>
               <a:t>of ways to achieve the minimal</a:t>
             </a:r>
           </a:p>
           <a:p>
             <a:r>
-              <a:rPr lang="en-US" dirty="0" smtClean="0"/>
+              <a:rPr lang="en-US" dirty="0"/>
               <a:t>sum of squares.</a:t>
             </a:r>
-            <a:endParaRPr lang="en-US" dirty="0"/>
           </a:p>
         </p:txBody>
       </p:sp>
@@ -5728,13 +5731,6 @@
   <p:clrMapOvr>
     <a:masterClrMapping/>
   </p:clrMapOvr>
-  <p:timing>
-    <p:tnLst>
-      <p:par>
-        <p:cTn id="1" dur="indefinite" restart="never" nodeType="tmRoot"/>
-      </p:par>
-    </p:tnLst>
-  </p:timing>
 </p:sld>
 </file>
 
@@ -5778,16 +5774,15 @@
           <a:lstStyle/>
           <a:p>
             <a:r>
-              <a:rPr lang="en-US" dirty="0" smtClean="0"/>
+              <a:rPr lang="en-US" dirty="0"/>
               <a:t>R will fix this by default… (We drop “raw=true” from our poly call)</a:t>
             </a:r>
           </a:p>
           <a:p>
             <a:r>
-              <a:rPr lang="en-US" dirty="0" smtClean="0"/>
+              <a:rPr lang="en-US" dirty="0"/>
               <a:t>R will rotate the data to an orthogonal basis where the X and X^2 terms are not correlated..</a:t>
             </a:r>
-            <a:endParaRPr lang="en-US" dirty="0"/>
           </a:p>
         </p:txBody>
       </p:sp>
@@ -5878,22 +5873,21 @@
           <a:lstStyle/>
           <a:p>
             <a:r>
-              <a:rPr lang="en-US" dirty="0" smtClean="0"/>
+              <a:rPr lang="en-US" dirty="0"/>
               <a:t>Much more on orthogonal bases later (the PCA lecture)</a:t>
             </a:r>
           </a:p>
           <a:p>
             <a:r>
-              <a:rPr lang="en-US" dirty="0" smtClean="0"/>
+              <a:rPr lang="en-US" dirty="0"/>
               <a:t>Note that B1 and B2 are no longer  simply days and days^2</a:t>
             </a:r>
           </a:p>
           <a:p>
             <a:r>
-              <a:rPr lang="en-US" dirty="0" smtClean="0"/>
+              <a:rPr lang="en-US" dirty="0"/>
               <a:t>This will make interpreting the results of the model with respect to our original data more difficult..</a:t>
             </a:r>
-            <a:endParaRPr lang="en-US" dirty="0"/>
           </a:p>
         </p:txBody>
       </p:sp>
@@ -5902,13 +5896,6 @@
   <p:clrMapOvr>
     <a:masterClrMapping/>
   </p:clrMapOvr>
-  <p:timing>
-    <p:tnLst>
-      <p:par>
-        <p:cTn id="1" dur="indefinite" restart="never" nodeType="tmRoot"/>
-      </p:par>
-    </p:tnLst>
-  </p:timing>
 </p:sld>
 </file>
 
@@ -5984,10 +5971,9 @@
           <a:lstStyle/>
           <a:p>
             <a:r>
-              <a:rPr lang="en-US" dirty="0" smtClean="0"/>
+              <a:rPr lang="en-US" dirty="0"/>
               <a:t>However our x and x^2 are no longer linearly correlated, so numerical stability is reintroduced into our model…</a:t>
             </a:r>
-            <a:endParaRPr lang="en-US" dirty="0"/>
           </a:p>
         </p:txBody>
       </p:sp>
@@ -6028,13 +6014,6 @@
   <p:clrMapOvr>
     <a:masterClrMapping/>
   </p:clrMapOvr>
-  <p:timing>
-    <p:tnLst>
-      <p:par>
-        <p:cTn id="1" dur="indefinite" restart="never" nodeType="tmRoot"/>
-      </p:par>
-    </p:tnLst>
-  </p:timing>
 </p:sld>
 </file>
 
@@ -6110,10 +6089,9 @@
           <a:lstStyle/>
           <a:p>
             <a:r>
-              <a:rPr lang="en-US" dirty="0" smtClean="0"/>
+              <a:rPr lang="en-US" dirty="0"/>
               <a:t>We proceed to look for the simplest model; we start by dropping six interaction terms!</a:t>
             </a:r>
-            <a:endParaRPr lang="en-US" dirty="0"/>
           </a:p>
         </p:txBody>
       </p:sp>
@@ -6172,10 +6150,9 @@
           <a:lstStyle/>
           <a:p>
             <a:r>
-              <a:rPr lang="en-US" dirty="0" smtClean="0"/>
+              <a:rPr lang="en-US" dirty="0"/>
               <a:t>Reduced model</a:t>
             </a:r>
-            <a:endParaRPr lang="en-US" dirty="0"/>
           </a:p>
         </p:txBody>
       </p:sp>
@@ -6202,10 +6179,9 @@
           <a:lstStyle/>
           <a:p>
             <a:r>
-              <a:rPr lang="en-US" dirty="0" smtClean="0"/>
+              <a:rPr lang="en-US" dirty="0"/>
               <a:t>Full model</a:t>
             </a:r>
-            <a:endParaRPr lang="en-US" dirty="0"/>
           </a:p>
         </p:txBody>
       </p:sp>
@@ -6279,13 +6255,6 @@
   <p:clrMapOvr>
     <a:masterClrMapping/>
   </p:clrMapOvr>
-  <p:timing>
-    <p:tnLst>
-      <p:par>
-        <p:cTn id="1" dur="indefinite" restart="never" nodeType="tmRoot"/>
-      </p:par>
-    </p:tnLst>
-  </p:timing>
 </p:sld>
 </file>
 
@@ -6329,30 +6298,26 @@
           <a:lstStyle/>
           <a:p>
             <a:r>
-              <a:rPr lang="en-US" dirty="0" smtClean="0">
+              <a:rPr lang="en-US" dirty="0">
                 <a:latin typeface="Arial" pitchFamily="34" charset="0"/>
                 <a:cs typeface="Arial" pitchFamily="34" charset="0"/>
               </a:rPr>
               <a:t>Consider our two parameter model for </a:t>
             </a:r>
             <a:r>
-              <a:rPr lang="en-US" dirty="0" err="1" smtClean="0">
+              <a:rPr lang="en-US" dirty="0" err="1">
                 <a:latin typeface="Arial" pitchFamily="34" charset="0"/>
                 <a:cs typeface="Arial" pitchFamily="34" charset="0"/>
               </a:rPr>
               <a:t>LogBurk</a:t>
             </a:r>
             <a:r>
-              <a:rPr lang="en-US" dirty="0" smtClean="0">
+              <a:rPr lang="en-US" dirty="0">
                 <a:latin typeface="Arial" pitchFamily="34" charset="0"/>
                 <a:cs typeface="Arial" pitchFamily="34" charset="0"/>
               </a:rPr>
               <a:t> vs. time from our last lab…  </a:t>
             </a:r>
-            <a:endParaRPr lang="en-US" dirty="0">
-              <a:latin typeface="Arial" pitchFamily="34" charset="0"/>
-              <a:cs typeface="Arial" pitchFamily="34" charset="0"/>
-            </a:endParaRPr>
           </a:p>
         </p:txBody>
       </p:sp>
@@ -6378,7 +6343,7 @@
           <a:lstStyle/>
           <a:p>
             <a:r>
-              <a:rPr lang="en-US" sz="1600" dirty="0" err="1" smtClean="0">
+              <a:rPr lang="en-US" sz="1600" dirty="0" err="1">
                 <a:solidFill>
                   <a:schemeClr val="bg1">
                     <a:lumMod val="50000"/>
@@ -6390,7 +6355,7 @@
               <a:t>myT</a:t>
             </a:r>
             <a:r>
-              <a:rPr lang="en-US" sz="1600" dirty="0" smtClean="0">
+              <a:rPr lang="en-US" sz="1600" dirty="0">
                 <a:solidFill>
                   <a:schemeClr val="bg1">
                     <a:lumMod val="50000"/>
@@ -6402,7 +6367,7 @@
               <a:t> &lt;- </a:t>
             </a:r>
             <a:r>
-              <a:rPr lang="en-US" sz="1600" dirty="0" err="1" smtClean="0">
+              <a:rPr lang="en-US" sz="1600" dirty="0" err="1">
                 <a:solidFill>
                   <a:schemeClr val="bg1">
                     <a:lumMod val="50000"/>
@@ -6414,7 +6379,7 @@
               <a:t>read.table</a:t>
             </a:r>
             <a:r>
-              <a:rPr lang="en-US" sz="1600" dirty="0" smtClean="0">
+              <a:rPr lang="en-US" sz="1600" dirty="0">
                 <a:solidFill>
                   <a:schemeClr val="bg1">
                     <a:lumMod val="50000"/>
@@ -6426,7 +6391,7 @@
               <a:t>("qPCRWithSampleDays.txt", </a:t>
             </a:r>
             <a:r>
-              <a:rPr lang="en-US" sz="1600" u="sng" dirty="0" smtClean="0">
+              <a:rPr lang="en-US" sz="1600" u="sng" dirty="0">
                 <a:solidFill>
                   <a:schemeClr val="bg1">
                     <a:lumMod val="50000"/>
@@ -6440,7 +6405,7 @@
           </a:p>
           <a:p>
             <a:r>
-              <a:rPr lang="en-US" sz="1600" dirty="0" err="1" smtClean="0">
+              <a:rPr lang="en-US" sz="1600" dirty="0" err="1">
                 <a:solidFill>
                   <a:schemeClr val="bg1">
                     <a:lumMod val="50000"/>
@@ -6452,7 +6417,7 @@
               <a:t>myLm</a:t>
             </a:r>
             <a:r>
-              <a:rPr lang="en-US" sz="1600" dirty="0" smtClean="0">
+              <a:rPr lang="en-US" sz="1600" dirty="0">
                 <a:solidFill>
                   <a:schemeClr val="bg1">
                     <a:lumMod val="50000"/>
@@ -6464,7 +6429,7 @@
               <a:t> &lt;- </a:t>
             </a:r>
             <a:r>
-              <a:rPr lang="en-US" sz="1600" u="sng" dirty="0" smtClean="0">
+              <a:rPr lang="en-US" sz="1600" u="sng" dirty="0">
                 <a:solidFill>
                   <a:schemeClr val="bg1">
                     <a:lumMod val="50000"/>
@@ -6476,7 +6441,7 @@
               <a:t>lm( </a:t>
             </a:r>
             <a:r>
-              <a:rPr lang="en-US" sz="1600" u="sng" dirty="0" err="1" smtClean="0">
+              <a:rPr lang="en-US" sz="1600" u="sng" dirty="0" err="1">
                 <a:solidFill>
                   <a:schemeClr val="bg1">
                     <a:lumMod val="50000"/>
@@ -6488,7 +6453,7 @@
               <a:t>myT$LogBurk</a:t>
             </a:r>
             <a:r>
-              <a:rPr lang="en-US" sz="1600" u="sng" dirty="0" smtClean="0">
+              <a:rPr lang="en-US" sz="1600" u="sng" dirty="0">
                 <a:solidFill>
                   <a:schemeClr val="bg1">
                     <a:lumMod val="50000"/>
@@ -6500,7 +6465,7 @@
               <a:t>  ~ </a:t>
             </a:r>
             <a:r>
-              <a:rPr lang="en-US" sz="1600" u="sng" dirty="0" err="1" smtClean="0">
+              <a:rPr lang="en-US" sz="1600" u="sng" dirty="0" err="1">
                 <a:solidFill>
                   <a:schemeClr val="bg1">
                     <a:lumMod val="50000"/>
@@ -6512,7 +6477,7 @@
               <a:t>myT$sampleDays</a:t>
             </a:r>
             <a:r>
-              <a:rPr lang="en-US" sz="1600" u="sng" dirty="0" smtClean="0">
+              <a:rPr lang="en-US" sz="1600" u="sng" dirty="0">
                 <a:solidFill>
                   <a:schemeClr val="bg1">
                     <a:lumMod val="50000"/>
@@ -6526,7 +6491,7 @@
           </a:p>
           <a:p>
             <a:r>
-              <a:rPr lang="en-US" sz="1600" dirty="0" smtClean="0">
+              <a:rPr lang="en-US" sz="1600" dirty="0">
                 <a:solidFill>
                   <a:schemeClr val="bg1">
                     <a:lumMod val="50000"/>
@@ -6538,7 +6503,7 @@
               <a:t>plot( </a:t>
             </a:r>
             <a:r>
-              <a:rPr lang="en-US" sz="1600" dirty="0" err="1" smtClean="0">
+              <a:rPr lang="en-US" sz="1600" dirty="0" err="1">
                 <a:solidFill>
                   <a:schemeClr val="bg1">
                     <a:lumMod val="50000"/>
@@ -6550,7 +6515,7 @@
               <a:t>myT$sampleDays</a:t>
             </a:r>
             <a:r>
-              <a:rPr lang="en-US" sz="1600" dirty="0" smtClean="0">
+              <a:rPr lang="en-US" sz="1600" dirty="0">
                 <a:solidFill>
                   <a:schemeClr val="bg1">
                     <a:lumMod val="50000"/>
@@ -6562,7 +6527,7 @@
               <a:t> , </a:t>
             </a:r>
             <a:r>
-              <a:rPr lang="en-US" sz="1600" dirty="0" err="1" smtClean="0">
+              <a:rPr lang="en-US" sz="1600" dirty="0" err="1">
                 <a:solidFill>
                   <a:schemeClr val="bg1">
                     <a:lumMod val="50000"/>
@@ -6574,7 +6539,7 @@
               <a:t>myT$LogBurk</a:t>
             </a:r>
             <a:r>
-              <a:rPr lang="en-US" sz="1600" dirty="0" smtClean="0">
+              <a:rPr lang="en-US" sz="1600" dirty="0">
                 <a:solidFill>
                   <a:schemeClr val="bg1">
                     <a:lumMod val="50000"/>
@@ -6588,7 +6553,7 @@
           </a:p>
           <a:p>
             <a:r>
-              <a:rPr lang="en-US" sz="1600" u="sng" dirty="0" err="1" smtClean="0">
+              <a:rPr lang="en-US" sz="1600" u="sng" dirty="0" err="1">
                 <a:solidFill>
                   <a:schemeClr val="bg1">
                     <a:lumMod val="50000"/>
@@ -6600,7 +6565,7 @@
               <a:t>abline</a:t>
             </a:r>
             <a:r>
-              <a:rPr lang="en-US" sz="1600" u="sng" dirty="0" smtClean="0">
+              <a:rPr lang="en-US" sz="1600" u="sng" dirty="0">
                 <a:solidFill>
                   <a:schemeClr val="bg1">
                     <a:lumMod val="50000"/>
@@ -6612,7 +6577,7 @@
               <a:t>( </a:t>
             </a:r>
             <a:r>
-              <a:rPr lang="en-US" sz="1600" u="sng" dirty="0" err="1" smtClean="0">
+              <a:rPr lang="en-US" sz="1600" u="sng" dirty="0" err="1">
                 <a:solidFill>
                   <a:schemeClr val="bg1">
                     <a:lumMod val="50000"/>
@@ -6624,7 +6589,7 @@
               <a:t>myLm</a:t>
             </a:r>
             <a:r>
-              <a:rPr lang="en-US" sz="1600" u="sng" dirty="0" smtClean="0">
+              <a:rPr lang="en-US" sz="1600" u="sng" dirty="0">
                 <a:solidFill>
                   <a:schemeClr val="bg1">
                     <a:lumMod val="50000"/>
@@ -6760,10 +6725,9 @@
           <a:lstStyle/>
           <a:p>
             <a:r>
-              <a:rPr lang="en-US" dirty="0" smtClean="0"/>
+              <a:rPr lang="en-US" dirty="0"/>
               <a:t>(Or with more typing…)</a:t>
             </a:r>
-            <a:endParaRPr lang="en-US" dirty="0"/>
           </a:p>
         </p:txBody>
       </p:sp>
@@ -6822,10 +6786,9 @@
           <a:lstStyle/>
           <a:p>
             <a:r>
-              <a:rPr lang="en-US" dirty="0" smtClean="0"/>
+              <a:rPr lang="en-US" dirty="0"/>
               <a:t>Reduced model</a:t>
             </a:r>
-            <a:endParaRPr lang="en-US" dirty="0"/>
           </a:p>
         </p:txBody>
       </p:sp>
@@ -6852,10 +6815,9 @@
           <a:lstStyle/>
           <a:p>
             <a:r>
-              <a:rPr lang="en-US" dirty="0" smtClean="0"/>
+              <a:rPr lang="en-US" dirty="0"/>
               <a:t>Full model</a:t>
             </a:r>
-            <a:endParaRPr lang="en-US" dirty="0"/>
           </a:p>
         </p:txBody>
       </p:sp>
@@ -6929,13 +6891,6 @@
   <p:clrMapOvr>
     <a:masterClrMapping/>
   </p:clrMapOvr>
-  <p:timing>
-    <p:tnLst>
-      <p:par>
-        <p:cTn id="1" dur="indefinite" restart="never" nodeType="tmRoot"/>
-      </p:par>
-    </p:tnLst>
-  </p:timing>
 </p:sld>
 </file>
 
@@ -7011,10 +6966,9 @@
           <a:lstStyle/>
           <a:p>
             <a:r>
-              <a:rPr lang="en-US" dirty="0" smtClean="0"/>
+              <a:rPr lang="en-US" dirty="0"/>
               <a:t>We drop the interaction terms and end up with a much more manageable six parameter model…</a:t>
             </a:r>
-            <a:endParaRPr lang="en-US" dirty="0"/>
           </a:p>
         </p:txBody>
       </p:sp>
@@ -7040,29 +6994,29 @@
           </a:bodyPr>
           <a:lstStyle/>
           <a:p>
-            <a:endParaRPr lang="en-US" sz="1400" dirty="0" smtClean="0"/>
-          </a:p>
-          <a:p>
-            <a:r>
-              <a:rPr lang="en-US" sz="1400" dirty="0" smtClean="0"/>
+            <a:endParaRPr lang="en-US" sz="1400" dirty="0"/>
+          </a:p>
+          <a:p>
+            <a:r>
+              <a:rPr lang="en-US" sz="1400" dirty="0"/>
               <a:t>B0 + </a:t>
             </a:r>
           </a:p>
           <a:p>
             <a:r>
-              <a:rPr lang="en-US" sz="1400" dirty="0" smtClean="0"/>
+              <a:rPr lang="en-US" sz="1400" dirty="0"/>
               <a:t>B1 * time + </a:t>
             </a:r>
           </a:p>
           <a:p>
             <a:r>
-              <a:rPr lang="en-US" sz="1400" dirty="0" smtClean="0"/>
+              <a:rPr lang="en-US" sz="1400" dirty="0"/>
               <a:t>B2 * time^2 + </a:t>
             </a:r>
           </a:p>
           <a:p>
             <a:r>
-              <a:rPr lang="en-US" sz="1400" dirty="0" smtClean="0"/>
+              <a:rPr lang="en-US" sz="1400" dirty="0"/>
               <a:t>3 dummy parameters for intercept</a:t>
             </a:r>
           </a:p>
@@ -7108,13 +7062,6 @@
   <p:clrMapOvr>
     <a:masterClrMapping/>
   </p:clrMapOvr>
-  <p:timing>
-    <p:tnLst>
-      <p:par>
-        <p:cTn id="1" dur="indefinite" restart="never" nodeType="tmRoot"/>
-      </p:par>
-    </p:tnLst>
-  </p:timing>
 </p:sld>
 </file>
 
@@ -7158,10 +7105,9 @@
           <a:lstStyle/>
           <a:p>
             <a:r>
-              <a:rPr lang="en-US" dirty="0" smtClean="0"/>
+              <a:rPr lang="en-US" dirty="0"/>
               <a:t>Treatment is still significantly different for all cases</a:t>
             </a:r>
-            <a:endParaRPr lang="en-US" dirty="0"/>
           </a:p>
         </p:txBody>
       </p:sp>
@@ -7266,13 +7212,6 @@
   <p:clrMapOvr>
     <a:masterClrMapping/>
   </p:clrMapOvr>
-  <p:timing>
-    <p:tnLst>
-      <p:par>
-        <p:cTn id="1" dur="indefinite" restart="never" nodeType="tmRoot"/>
-      </p:par>
-    </p:tnLst>
-  </p:timing>
 </p:sld>
 </file>
 
@@ -7348,10 +7287,9 @@
           <a:lstStyle/>
           <a:p>
             <a:r>
-              <a:rPr lang="en-US" dirty="0" smtClean="0"/>
+              <a:rPr lang="en-US" dirty="0"/>
               <a:t>The p-value tells us whether each additional parameter of higher order is significant</a:t>
             </a:r>
-            <a:endParaRPr lang="en-US" dirty="0"/>
           </a:p>
         </p:txBody>
       </p:sp>
@@ -7411,22 +7349,21 @@
           <a:lstStyle/>
           <a:p>
             <a:r>
-              <a:rPr lang="en-US" dirty="0" smtClean="0"/>
+              <a:rPr lang="en-US" dirty="0"/>
               <a:t>Our 6 parameter model captures</a:t>
             </a:r>
           </a:p>
           <a:p>
             <a:r>
-              <a:rPr lang="en-US" dirty="0" smtClean="0"/>
+              <a:rPr lang="en-US" dirty="0"/>
               <a:t>significantly more variability that</a:t>
             </a:r>
           </a:p>
           <a:p>
             <a:r>
-              <a:rPr lang="en-US" dirty="0" smtClean="0"/>
+              <a:rPr lang="en-US" dirty="0"/>
               <a:t>the 5 parameter model..</a:t>
             </a:r>
-            <a:endParaRPr lang="en-US" dirty="0"/>
           </a:p>
         </p:txBody>
       </p:sp>
@@ -7453,16 +7390,15 @@
           <a:lstStyle/>
           <a:p>
             <a:r>
-              <a:rPr lang="en-US" dirty="0" smtClean="0"/>
+              <a:rPr lang="en-US" dirty="0"/>
               <a:t>Full:  B0+ B1 *days + B2 * days^2</a:t>
             </a:r>
           </a:p>
           <a:p>
             <a:r>
-              <a:rPr lang="en-US" dirty="0" smtClean="0"/>
+              <a:rPr lang="en-US" dirty="0"/>
               <a:t>	+ 3 dummy intercept terms</a:t>
             </a:r>
-            <a:endParaRPr lang="en-US" dirty="0"/>
           </a:p>
         </p:txBody>
       </p:sp>
@@ -7489,10 +7425,9 @@
           <a:lstStyle/>
           <a:p>
             <a:r>
-              <a:rPr lang="en-US" dirty="0" smtClean="0"/>
+              <a:rPr lang="en-US" dirty="0"/>
               <a:t>Reduced: B0+ B1 *days + 3 dummy intercept terms</a:t>
             </a:r>
-            <a:endParaRPr lang="en-US" dirty="0"/>
           </a:p>
         </p:txBody>
       </p:sp>
@@ -7501,13 +7436,6 @@
   <p:clrMapOvr>
     <a:masterClrMapping/>
   </p:clrMapOvr>
-  <p:timing>
-    <p:tnLst>
-      <p:par>
-        <p:cTn id="1" dur="indefinite" restart="never" nodeType="tmRoot"/>
-      </p:par>
-    </p:tnLst>
-  </p:timing>
 </p:sld>
 </file>
 
@@ -7615,10 +7543,9 @@
           <a:lstStyle/>
           <a:p>
             <a:r>
-              <a:rPr lang="en-US" dirty="0" smtClean="0"/>
+              <a:rPr lang="en-US" dirty="0"/>
               <a:t>We can add a term for X^3 ( 7 parameter model) ; we still explain significantly more variance </a:t>
             </a:r>
-            <a:endParaRPr lang="en-US" dirty="0"/>
           </a:p>
         </p:txBody>
       </p:sp>
@@ -7660,13 +7587,6 @@
   <p:clrMapOvr>
     <a:masterClrMapping/>
   </p:clrMapOvr>
-  <p:timing>
-    <p:tnLst>
-      <p:par>
-        <p:cTn id="1" dur="indefinite" restart="never" nodeType="tmRoot"/>
-      </p:par>
-    </p:tnLst>
-  </p:timing>
 </p:sld>
 </file>
 
@@ -7774,10 +7694,9 @@
           <a:lstStyle/>
           <a:p>
             <a:r>
-              <a:rPr lang="en-US" dirty="0" smtClean="0"/>
+              <a:rPr lang="en-US" dirty="0"/>
               <a:t>We can add a term for X^4 ( 8 parameter model) ; we still explain significantly more variance </a:t>
             </a:r>
-            <a:endParaRPr lang="en-US" dirty="0"/>
           </a:p>
         </p:txBody>
       </p:sp>
@@ -7819,13 +7738,6 @@
   <p:clrMapOvr>
     <a:masterClrMapping/>
   </p:clrMapOvr>
-  <p:timing>
-    <p:tnLst>
-      <p:par>
-        <p:cTn id="1" dur="indefinite" restart="never" nodeType="tmRoot"/>
-      </p:par>
-    </p:tnLst>
-  </p:timing>
 </p:sld>
 </file>
 
@@ -7933,10 +7845,9 @@
           <a:lstStyle/>
           <a:p>
             <a:r>
-              <a:rPr lang="en-US" dirty="0" smtClean="0"/>
+              <a:rPr lang="en-US" dirty="0"/>
               <a:t>We can add a term for X^5 ( 9 parameter model) ; we still explain significantly more variance </a:t>
             </a:r>
-            <a:endParaRPr lang="en-US" dirty="0"/>
           </a:p>
         </p:txBody>
       </p:sp>
@@ -7978,13 +7889,6 @@
   <p:clrMapOvr>
     <a:masterClrMapping/>
   </p:clrMapOvr>
-  <p:timing>
-    <p:tnLst>
-      <p:par>
-        <p:cTn id="1" dur="indefinite" restart="never" nodeType="tmRoot"/>
-      </p:par>
-    </p:tnLst>
-  </p:timing>
 </p:sld>
 </file>
 
@@ -8092,10 +7996,9 @@
           <a:lstStyle/>
           <a:p>
             <a:r>
-              <a:rPr lang="en-US" dirty="0" smtClean="0"/>
+              <a:rPr lang="en-US" dirty="0"/>
               <a:t>We can add a term for X^6 ( 10 parameter model); the additional parameter doesn’t matter!</a:t>
             </a:r>
-            <a:endParaRPr lang="en-US" dirty="0"/>
           </a:p>
         </p:txBody>
       </p:sp>
@@ -8137,13 +8040,6 @@
   <p:clrMapOvr>
     <a:masterClrMapping/>
   </p:clrMapOvr>
-  <p:timing>
-    <p:tnLst>
-      <p:par>
-        <p:cTn id="1" dur="indefinite" restart="never" nodeType="tmRoot"/>
-      </p:par>
-    </p:tnLst>
-  </p:timing>
 </p:sld>
 </file>
 
@@ -8219,10 +8115,9 @@
           <a:lstStyle/>
           <a:p>
             <a:r>
-              <a:rPr lang="en-US" dirty="0" smtClean="0"/>
+              <a:rPr lang="en-US" dirty="0"/>
               <a:t>X</a:t>
             </a:r>
-            <a:endParaRPr lang="en-US" dirty="0"/>
           </a:p>
         </p:txBody>
       </p:sp>
@@ -8281,10 +8176,9 @@
           <a:lstStyle/>
           <a:p>
             <a:r>
-              <a:rPr lang="en-US" dirty="0" smtClean="0"/>
+              <a:rPr lang="en-US" dirty="0"/>
               <a:t>X^2</a:t>
             </a:r>
-            <a:endParaRPr lang="en-US" dirty="0"/>
           </a:p>
         </p:txBody>
       </p:sp>
@@ -8343,10 +8237,9 @@
           <a:lstStyle/>
           <a:p>
             <a:r>
-              <a:rPr lang="en-US" dirty="0" smtClean="0"/>
+              <a:rPr lang="en-US" dirty="0"/>
               <a:t>X^3</a:t>
             </a:r>
-            <a:endParaRPr lang="en-US" dirty="0"/>
           </a:p>
         </p:txBody>
       </p:sp>
@@ -8405,10 +8298,9 @@
           <a:lstStyle/>
           <a:p>
             <a:r>
-              <a:rPr lang="en-US" dirty="0" smtClean="0"/>
+              <a:rPr lang="en-US" dirty="0"/>
               <a:t>X^4</a:t>
             </a:r>
-            <a:endParaRPr lang="en-US" dirty="0"/>
           </a:p>
         </p:txBody>
       </p:sp>
@@ -8467,10 +8359,9 @@
           <a:lstStyle/>
           <a:p>
             <a:r>
-              <a:rPr lang="en-US" dirty="0" smtClean="0"/>
+              <a:rPr lang="en-US" dirty="0"/>
               <a:t>X^5</a:t>
             </a:r>
-            <a:endParaRPr lang="en-US" dirty="0"/>
           </a:p>
         </p:txBody>
       </p:sp>
@@ -8497,10 +8388,9 @@
           <a:lstStyle/>
           <a:p>
             <a:r>
-              <a:rPr lang="en-US" dirty="0" smtClean="0"/>
+              <a:rPr lang="en-US" dirty="0"/>
               <a:t>X^6</a:t>
             </a:r>
-            <a:endParaRPr lang="en-US" dirty="0"/>
           </a:p>
         </p:txBody>
       </p:sp>
@@ -8559,10 +8449,9 @@
           <a:lstStyle/>
           <a:p>
             <a:r>
-              <a:rPr lang="en-US" dirty="0" smtClean="0"/>
+              <a:rPr lang="en-US" dirty="0"/>
               <a:t>We can visually see the improvement to the fit with increasing parameters…</a:t>
             </a:r>
-            <a:endParaRPr lang="en-US" dirty="0"/>
           </a:p>
         </p:txBody>
       </p:sp>
@@ -8571,13 +8460,6 @@
   <p:clrMapOvr>
     <a:masterClrMapping/>
   </p:clrMapOvr>
-  <p:timing>
-    <p:tnLst>
-      <p:par>
-        <p:cTn id="1" dur="indefinite" restart="never" nodeType="tmRoot"/>
-      </p:par>
-    </p:tnLst>
-  </p:timing>
 </p:sld>
 </file>
 
@@ -8653,10 +8535,9 @@
           <a:lstStyle/>
           <a:p>
             <a:r>
-              <a:rPr lang="en-US" dirty="0" smtClean="0"/>
+              <a:rPr lang="en-US" dirty="0"/>
               <a:t>Confirm that the interaction terms are still irrelevant to our x^5 model</a:t>
             </a:r>
-            <a:endParaRPr lang="en-US" dirty="0"/>
           </a:p>
         </p:txBody>
       </p:sp>
@@ -8716,44 +8597,44 @@
           <a:lstStyle/>
           <a:p>
             <a:r>
-              <a:rPr lang="en-US" dirty="0" smtClean="0"/>
+              <a:rPr lang="en-US" dirty="0"/>
               <a:t>They still don’t help.  (Which is good because there are 15 interaction terms!)</a:t>
             </a:r>
           </a:p>
           <a:p>
             <a:r>
-              <a:rPr lang="en-US" dirty="0" smtClean="0"/>
+              <a:rPr lang="en-US" dirty="0"/>
               <a:t>(5 exponent terms * 3 dummy variables)</a:t>
             </a:r>
           </a:p>
           <a:p>
-            <a:endParaRPr lang="en-US" dirty="0" smtClean="0"/>
-          </a:p>
-          <a:p>
-            <a:r>
-              <a:rPr lang="en-US" dirty="0" smtClean="0"/>
+            <a:endParaRPr lang="en-US" dirty="0"/>
+          </a:p>
+          <a:p>
+            <a:r>
+              <a:rPr lang="en-US" dirty="0"/>
               <a:t>{ x, x^2, x^3, x^4, x^5 } * { 3 dummy variables} </a:t>
             </a:r>
           </a:p>
           <a:p>
-            <a:endParaRPr lang="en-US" dirty="0" smtClean="0"/>
-          </a:p>
-          <a:p>
-            <a:r>
-              <a:rPr lang="en-US" dirty="0" smtClean="0"/>
+            <a:endParaRPr lang="en-US" dirty="0"/>
+          </a:p>
+          <a:p>
+            <a:r>
+              <a:rPr lang="en-US" dirty="0"/>
               <a:t>So we end up with a 9 parameter model instead of a 24 parameter model</a:t>
             </a:r>
           </a:p>
           <a:p>
-            <a:endParaRPr lang="en-US" dirty="0" smtClean="0"/>
-          </a:p>
-          <a:p>
-            <a:r>
-              <a:rPr lang="en-US" dirty="0" smtClean="0"/>
+            <a:endParaRPr lang="en-US" dirty="0"/>
+          </a:p>
+          <a:p>
+            <a:r>
+              <a:rPr lang="en-US" dirty="0"/>
               <a:t>B0 + B1*X + B2*X^2 + B3*X^3 + B4*X^4 + B5*X^5 + 3 dummy intercept </a:t>
             </a:r>
             <a:r>
-              <a:rPr lang="en-US" dirty="0" err="1" smtClean="0"/>
+              <a:rPr lang="en-US" dirty="0" err="1"/>
               <a:t>params</a:t>
             </a:r>
             <a:endParaRPr lang="en-US" dirty="0"/>
@@ -8765,13 +8646,6 @@
   <p:clrMapOvr>
     <a:masterClrMapping/>
   </p:clrMapOvr>
-  <p:timing>
-    <p:tnLst>
-      <p:par>
-        <p:cTn id="1" dur="indefinite" restart="never" nodeType="tmRoot"/>
-      </p:par>
-    </p:tnLst>
-  </p:timing>
 </p:sld>
 </file>
 
@@ -8815,26 +8689,25 @@
           <a:lstStyle/>
           <a:p>
             <a:r>
-              <a:rPr lang="en-US" dirty="0" smtClean="0"/>
+              <a:rPr lang="en-US" dirty="0"/>
               <a:t>The residuals is the distance between the model (y-hat) and the </a:t>
             </a:r>
             <a:r>
-              <a:rPr lang="en-US" dirty="0" err="1" smtClean="0"/>
+              <a:rPr lang="en-US" dirty="0" err="1"/>
               <a:t>datapoints</a:t>
             </a:r>
             <a:r>
-              <a:rPr lang="en-US" dirty="0" smtClean="0"/>
+              <a:rPr lang="en-US" dirty="0"/>
               <a:t> (Y</a:t>
             </a:r>
             <a:r>
-              <a:rPr lang="en-US" baseline="-25000" dirty="0" smtClean="0"/>
+              <a:rPr lang="en-US" baseline="-25000" dirty="0"/>
               <a:t>i</a:t>
             </a:r>
             <a:r>
-              <a:rPr lang="en-US" dirty="0" smtClean="0"/>
+              <a:rPr lang="en-US" dirty="0"/>
               <a:t>)  </a:t>
             </a:r>
-            <a:endParaRPr lang="en-US" dirty="0"/>
           </a:p>
         </p:txBody>
       </p:sp>
@@ -8860,7 +8733,7 @@
           <a:lstStyle/>
           <a:p>
             <a:r>
-              <a:rPr lang="en-US" dirty="0" err="1" smtClean="0">
+              <a:rPr lang="en-US" dirty="0" err="1">
                 <a:solidFill>
                   <a:schemeClr val="bg1">
                     <a:lumMod val="50000"/>
@@ -8870,7 +8743,7 @@
               <a:t>hist</a:t>
             </a:r>
             <a:r>
-              <a:rPr lang="en-US" dirty="0" smtClean="0">
+              <a:rPr lang="en-US" dirty="0">
                 <a:solidFill>
                   <a:schemeClr val="bg1">
                     <a:lumMod val="50000"/>
@@ -8880,7 +8753,7 @@
               <a:t>(residuals(</a:t>
             </a:r>
             <a:r>
-              <a:rPr lang="en-US" dirty="0" err="1" smtClean="0">
+              <a:rPr lang="en-US" dirty="0" err="1">
                 <a:solidFill>
                   <a:schemeClr val="bg1">
                     <a:lumMod val="50000"/>
@@ -8890,7 +8763,7 @@
               <a:t>myLm</a:t>
             </a:r>
             <a:r>
-              <a:rPr lang="en-US" dirty="0" smtClean="0">
+              <a:rPr lang="en-US" dirty="0">
                 <a:solidFill>
                   <a:schemeClr val="bg1">
                     <a:lumMod val="50000"/>
@@ -8899,13 +8772,6 @@
               </a:rPr>
               <a:t>))</a:t>
             </a:r>
-            <a:endParaRPr lang="en-US" dirty="0">
-              <a:solidFill>
-                <a:schemeClr val="bg1">
-                  <a:lumMod val="50000"/>
-                </a:schemeClr>
-              </a:solidFill>
-            </a:endParaRPr>
           </a:p>
         </p:txBody>
       </p:sp>
@@ -8965,16 +8831,15 @@
           <a:lstStyle/>
           <a:p>
             <a:r>
-              <a:rPr lang="en-US" dirty="0" smtClean="0"/>
+              <a:rPr lang="en-US" dirty="0"/>
               <a:t>We define the likelihood as the product of the probabilities of all the residues relative to this</a:t>
             </a:r>
           </a:p>
           <a:p>
             <a:r>
-              <a:rPr lang="en-US" dirty="0" smtClean="0"/>
+              <a:rPr lang="en-US" dirty="0"/>
               <a:t>distribution… </a:t>
             </a:r>
-            <a:endParaRPr lang="en-US" dirty="0"/>
           </a:p>
         </p:txBody>
       </p:sp>
@@ -9000,7 +8865,7 @@
           <a:lstStyle/>
           <a:p>
             <a:r>
-              <a:rPr lang="en-US" dirty="0" smtClean="0">
+              <a:rPr lang="en-US" dirty="0">
                 <a:solidFill>
                   <a:schemeClr val="bg1">
                     <a:lumMod val="50000"/>
@@ -9010,7 +8875,7 @@
               <a:t>sum(log( </a:t>
             </a:r>
             <a:r>
-              <a:rPr lang="en-US" u="sng" dirty="0" err="1" smtClean="0">
+              <a:rPr lang="en-US" u="sng" dirty="0" err="1">
                 <a:solidFill>
                   <a:schemeClr val="bg1">
                     <a:lumMod val="50000"/>
@@ -9020,7 +8885,7 @@
               <a:t>dnorm</a:t>
             </a:r>
             <a:r>
-              <a:rPr lang="en-US" u="sng" dirty="0" smtClean="0">
+              <a:rPr lang="en-US" u="sng" dirty="0">
                 <a:solidFill>
                   <a:schemeClr val="bg1">
                     <a:lumMod val="50000"/>
@@ -9030,7 +8895,7 @@
               <a:t>( res, mean=mean(res), </a:t>
             </a:r>
             <a:r>
-              <a:rPr lang="en-US" u="sng" dirty="0" err="1" smtClean="0">
+              <a:rPr lang="en-US" u="sng" dirty="0" err="1">
                 <a:solidFill>
                   <a:schemeClr val="bg1">
                     <a:lumMod val="50000"/>
@@ -9040,7 +8905,7 @@
               <a:t>sd</a:t>
             </a:r>
             <a:r>
-              <a:rPr lang="en-US" u="sng" dirty="0" smtClean="0">
+              <a:rPr lang="en-US" u="sng" dirty="0">
                 <a:solidFill>
                   <a:schemeClr val="bg1">
                     <a:lumMod val="50000"/>
@@ -9050,7 +8915,7 @@
               <a:t>=</a:t>
             </a:r>
             <a:r>
-              <a:rPr lang="en-US" u="sng" dirty="0" err="1" smtClean="0">
+              <a:rPr lang="en-US" u="sng" dirty="0" err="1">
                 <a:solidFill>
                   <a:schemeClr val="bg1">
                     <a:lumMod val="50000"/>
@@ -9060,7 +8925,7 @@
               <a:t>sd</a:t>
             </a:r>
             <a:r>
-              <a:rPr lang="en-US" u="sng" dirty="0" smtClean="0">
+              <a:rPr lang="en-US" u="sng" dirty="0">
                 <a:solidFill>
                   <a:schemeClr val="bg1">
                     <a:lumMod val="50000"/>
@@ -9255,10 +9120,9 @@
           <a:lstStyle/>
           <a:p>
             <a:r>
-              <a:rPr lang="en-US" dirty="0" smtClean="0"/>
+              <a:rPr lang="en-US" dirty="0"/>
               <a:t>We confirm that the assumption of normality is not blatantly violated by our 9 parameter model </a:t>
             </a:r>
-            <a:endParaRPr lang="en-US" dirty="0"/>
           </a:p>
         </p:txBody>
       </p:sp>
@@ -9267,13 +9131,6 @@
   <p:clrMapOvr>
     <a:masterClrMapping/>
   </p:clrMapOvr>
-  <p:timing>
-    <p:tnLst>
-      <p:par>
-        <p:cTn id="1" dur="indefinite" restart="never" nodeType="tmRoot"/>
-      </p:par>
-    </p:tnLst>
-  </p:timing>
 </p:sld>
 </file>
 
@@ -9317,22 +9174,21 @@
           <a:lstStyle/>
           <a:p>
             <a:r>
-              <a:rPr lang="en-US" dirty="0" smtClean="0"/>
+              <a:rPr lang="en-US" dirty="0"/>
               <a:t>Calculating the likelihood of models</a:t>
             </a:r>
           </a:p>
           <a:p>
             <a:r>
-              <a:rPr lang="en-US" dirty="0" smtClean="0"/>
+              <a:rPr lang="en-US" dirty="0"/>
               <a:t>Linear models with higher exponential terms</a:t>
             </a:r>
           </a:p>
           <a:p>
             <a:r>
-              <a:rPr lang="en-US" dirty="0" smtClean="0"/>
+              <a:rPr lang="en-US" dirty="0"/>
               <a:t>AIC criteria</a:t>
             </a:r>
-            <a:endParaRPr lang="en-US" dirty="0"/>
           </a:p>
         </p:txBody>
       </p:sp>
@@ -9417,22 +9273,21 @@
           <a:lstStyle/>
           <a:p>
             <a:r>
-              <a:rPr lang="en-US" dirty="0" smtClean="0"/>
+              <a:rPr lang="en-US" dirty="0"/>
               <a:t>But which of these models is the “best” –</a:t>
             </a:r>
           </a:p>
           <a:p>
             <a:r>
-              <a:rPr lang="en-US" dirty="0" smtClean="0"/>
+              <a:rPr lang="en-US" dirty="0"/>
               <a:t>	As you increase the # of parameters, the error will go to zero.</a:t>
             </a:r>
           </a:p>
           <a:p>
             <a:r>
-              <a:rPr lang="en-US" dirty="0" smtClean="0"/>
+              <a:rPr lang="en-US" dirty="0"/>
               <a:t>	But that is just over-fitting the data!</a:t>
             </a:r>
-            <a:endParaRPr lang="en-US" dirty="0"/>
           </a:p>
         </p:txBody>
       </p:sp>
@@ -9484,11 +9339,11 @@
           <a:lstStyle/>
           <a:p>
             <a:r>
-              <a:rPr lang="en-US" dirty="0" smtClean="0"/>
+              <a:rPr lang="en-US" dirty="0"/>
               <a:t>The question of when a model is over-fit is not </a:t>
             </a:r>
             <a:r>
-              <a:rPr lang="en-US" smtClean="0"/>
+              <a:rPr lang="en-US"/>
               <a:t>merely academic!</a:t>
             </a:r>
             <a:endParaRPr lang="en-US" dirty="0"/>
@@ -9549,10 +9404,9 @@
           <a:lstStyle/>
           <a:p>
             <a:r>
-              <a:rPr lang="en-US" dirty="0" smtClean="0"/>
+              <a:rPr lang="en-US" dirty="0"/>
               <a:t>http://www.wsj.com/articles/how-computers-trawl-a-sea-of-data-for-stock-picks-1427941801</a:t>
             </a:r>
-            <a:endParaRPr lang="en-US" dirty="0"/>
           </a:p>
         </p:txBody>
       </p:sp>
@@ -9636,10 +9490,9 @@
           <a:lstStyle/>
           <a:p>
             <a:r>
-              <a:rPr lang="en-US" dirty="0" smtClean="0"/>
+              <a:rPr lang="en-US" dirty="0"/>
               <a:t>or</a:t>
             </a:r>
-            <a:endParaRPr lang="en-US" dirty="0"/>
           </a:p>
         </p:txBody>
       </p:sp>
@@ -9723,19 +9576,18 @@
           <a:lstStyle/>
           <a:p>
             <a:r>
-              <a:rPr lang="en-US" dirty="0" smtClean="0"/>
+              <a:rPr lang="en-US" dirty="0"/>
               <a:t>How do we choose between different models?</a:t>
             </a:r>
           </a:p>
           <a:p>
-            <a:endParaRPr lang="en-US" dirty="0" smtClean="0"/>
-          </a:p>
-          <a:p>
-            <a:r>
-              <a:rPr lang="en-US" dirty="0" smtClean="0"/>
+            <a:endParaRPr lang="en-US" dirty="0"/>
+          </a:p>
+          <a:p>
+            <a:r>
+              <a:rPr lang="en-US" dirty="0"/>
               <a:t>No perfect answer (of course) but a popular method is the AIC </a:t>
             </a:r>
-            <a:endParaRPr lang="en-US" dirty="0"/>
           </a:p>
         </p:txBody>
       </p:sp>
@@ -9793,10 +9645,9 @@
           <a:lstStyle/>
           <a:p>
             <a:r>
-              <a:rPr lang="en-US" dirty="0" smtClean="0"/>
+              <a:rPr lang="en-US" dirty="0"/>
               <a:t>http://en.wikipedia.org/wiki/Akaike_information_criterion</a:t>
             </a:r>
-            <a:endParaRPr lang="en-US" dirty="0"/>
           </a:p>
         </p:txBody>
       </p:sp>
@@ -9848,10 +9699,9 @@
           <a:lstStyle/>
           <a:p>
             <a:r>
-              <a:rPr lang="en-US" dirty="0" smtClean="0"/>
+              <a:rPr lang="en-US" dirty="0"/>
               <a:t>The AIC has a very simple way of balancing model complexity and fit</a:t>
             </a:r>
-            <a:endParaRPr lang="en-US" dirty="0"/>
           </a:p>
         </p:txBody>
       </p:sp>
@@ -9909,10 +9759,9 @@
           <a:lstStyle/>
           <a:p>
             <a:r>
-              <a:rPr lang="en-US" dirty="0" smtClean="0"/>
+              <a:rPr lang="en-US" dirty="0"/>
               <a:t>http://en.wikipedia.org/wiki/Akaike_information_criterion</a:t>
             </a:r>
-            <a:endParaRPr lang="en-US" dirty="0"/>
           </a:p>
         </p:txBody>
       </p:sp>
@@ -9996,16 +9845,12 @@
           <a:lstStyle/>
           <a:p>
             <a:r>
-              <a:rPr lang="en-US" dirty="0" smtClean="0">
+              <a:rPr lang="en-US" dirty="0">
                 <a:latin typeface="Arial" pitchFamily="34" charset="0"/>
                 <a:cs typeface="Arial" pitchFamily="34" charset="0"/>
               </a:rPr>
               <a:t>Easy to calculate…</a:t>
             </a:r>
-            <a:endParaRPr lang="en-US" dirty="0">
-              <a:latin typeface="Arial" pitchFamily="34" charset="0"/>
-              <a:cs typeface="Arial" pitchFamily="34" charset="0"/>
-            </a:endParaRPr>
           </a:p>
         </p:txBody>
       </p:sp>
@@ -10032,10 +9877,9 @@
           <a:lstStyle/>
           <a:p>
             <a:r>
-              <a:rPr lang="en-US" dirty="0" smtClean="0"/>
+              <a:rPr lang="en-US" dirty="0"/>
               <a:t>Three parameters: slope, intercept and mean of the residuals…</a:t>
             </a:r>
-            <a:endParaRPr lang="en-US" dirty="0"/>
           </a:p>
         </p:txBody>
       </p:sp>
@@ -10151,14 +9995,13 @@
           <a:lstStyle/>
           <a:p>
             <a:r>
-              <a:rPr lang="en-US" dirty="0" smtClean="0"/>
+              <a:rPr lang="en-US" dirty="0"/>
               <a:t>The AIC criteria seems to like the </a:t>
             </a:r>
             <a:r>
-              <a:rPr lang="en-US" smtClean="0"/>
+              <a:rPr lang="en-US"/>
               <a:t>5 parameter model…</a:t>
             </a:r>
-            <a:endParaRPr lang="en-US"/>
           </a:p>
         </p:txBody>
       </p:sp>
@@ -10210,54 +10053,18 @@
           <a:lstStyle/>
           <a:p>
             <a:r>
-              <a:rPr lang="en-US" dirty="0" smtClean="0">
+              <a:rPr lang="en-US" dirty="0">
                 <a:latin typeface="Arial" pitchFamily="34" charset="0"/>
                 <a:cs typeface="Arial" pitchFamily="34" charset="0"/>
               </a:rPr>
               <a:t>A closely related alternative to this is the Bayesian information criterion</a:t>
             </a:r>
-            <a:endParaRPr lang="en-US" dirty="0">
-              <a:latin typeface="Arial" pitchFamily="34" charset="0"/>
-              <a:cs typeface="Arial" pitchFamily="34" charset="0"/>
-            </a:endParaRPr>
           </a:p>
         </p:txBody>
       </p:sp>
       <p:pic>
         <p:nvPicPr>
           <p:cNvPr id="4098" name="Picture 2"/>
-          <p:cNvPicPr>
-            <a:picLocks noChangeAspect="1" noChangeArrowheads="1"/>
-          </p:cNvPicPr>
-          <p:nvPr/>
-        </p:nvPicPr>
-        <p:blipFill>
-          <a:blip r:embed="rId2" cstate="print"/>
-          <a:srcRect/>
-          <a:stretch>
-            <a:fillRect/>
-          </a:stretch>
-        </p:blipFill>
-        <p:spPr bwMode="auto">
-          <a:xfrm>
-            <a:off x="2286000" y="1219200"/>
-            <a:ext cx="4448175" cy="876300"/>
-          </a:xfrm>
-          <a:prstGeom prst="rect">
-            <a:avLst/>
-          </a:prstGeom>
-          <a:noFill/>
-          <a:ln w="9525">
-            <a:noFill/>
-            <a:miter lim="800000"/>
-            <a:headEnd/>
-            <a:tailEnd/>
-          </a:ln>
-        </p:spPr>
-      </p:pic>
-      <p:pic>
-        <p:nvPicPr>
-          <p:cNvPr id="4099" name="Picture 3"/>
           <p:cNvPicPr>
             <a:picLocks noChangeAspect="1" noChangeArrowheads="1"/>
           </p:cNvPicPr>
@@ -10272,8 +10079,8 @@
         </p:blipFill>
         <p:spPr bwMode="auto">
           <a:xfrm>
-            <a:off x="323850" y="2152650"/>
-            <a:ext cx="8496300" cy="2552700"/>
+            <a:off x="2286000" y="1219200"/>
+            <a:ext cx="4448175" cy="876300"/>
           </a:xfrm>
           <a:prstGeom prst="rect">
             <a:avLst/>
@@ -10287,6 +10094,106 @@
           </a:ln>
         </p:spPr>
       </p:pic>
+      <p:pic>
+        <p:nvPicPr>
+          <p:cNvPr id="4099" name="Picture 3"/>
+          <p:cNvPicPr>
+            <a:picLocks noChangeAspect="1" noChangeArrowheads="1"/>
+          </p:cNvPicPr>
+          <p:nvPr/>
+        </p:nvPicPr>
+        <p:blipFill>
+          <a:blip r:embed="rId4" cstate="print"/>
+          <a:srcRect/>
+          <a:stretch>
+            <a:fillRect/>
+          </a:stretch>
+        </p:blipFill>
+        <p:spPr bwMode="auto">
+          <a:xfrm>
+            <a:off x="323850" y="2152650"/>
+            <a:ext cx="8496300" cy="2552700"/>
+          </a:xfrm>
+          <a:prstGeom prst="rect">
+            <a:avLst/>
+          </a:prstGeom>
+          <a:noFill/>
+          <a:ln w="9525">
+            <a:noFill/>
+            <a:miter lim="800000"/>
+            <a:headEnd/>
+            <a:tailEnd/>
+          </a:ln>
+        </p:spPr>
+      </p:pic>
+      <p:cxnSp>
+        <p:nvCxnSpPr>
+          <p:cNvPr id="3" name="Straight Arrow Connector 2"/>
+          <p:cNvCxnSpPr/>
+          <p:nvPr/>
+        </p:nvCxnSpPr>
+        <p:spPr>
+          <a:xfrm flipH="1" flipV="1">
+            <a:off x="6019800" y="2057400"/>
+            <a:ext cx="914400" cy="152400"/>
+          </a:xfrm>
+          <a:prstGeom prst="straightConnector1">
+            <a:avLst/>
+          </a:prstGeom>
+          <a:ln>
+            <a:tailEnd type="triangle"/>
+          </a:ln>
+        </p:spPr>
+        <p:style>
+          <a:lnRef idx="1">
+            <a:schemeClr val="accent1"/>
+          </a:lnRef>
+          <a:fillRef idx="0">
+            <a:schemeClr val="accent1"/>
+          </a:fillRef>
+          <a:effectRef idx="0">
+            <a:schemeClr val="accent1"/>
+          </a:effectRef>
+          <a:fontRef idx="minor">
+            <a:schemeClr val="tx1"/>
+          </a:fontRef>
+        </p:style>
+      </p:cxnSp>
+      <p:sp>
+        <p:nvSpPr>
+          <p:cNvPr id="5" name="TextBox 4"/>
+          <p:cNvSpPr txBox="1"/>
+          <p:nvPr/>
+        </p:nvSpPr>
+        <p:spPr>
+          <a:xfrm>
+            <a:off x="7086600" y="2209800"/>
+            <a:ext cx="2133600" cy="646331"/>
+          </a:xfrm>
+          <a:prstGeom prst="rect">
+            <a:avLst/>
+          </a:prstGeom>
+          <a:noFill/>
+        </p:spPr>
+        <p:txBody>
+          <a:bodyPr wrap="square" rtlCol="0">
+            <a:spAutoFit/>
+          </a:bodyPr>
+          <a:lstStyle/>
+          <a:p>
+            <a:r>
+              <a:rPr lang="en-US" dirty="0"/>
+              <a:t>Add a term for</a:t>
+            </a:r>
+          </a:p>
+          <a:p>
+            <a:r>
+              <a:rPr lang="en-US" dirty="0"/>
+              <a:t>the sample size</a:t>
+            </a:r>
+          </a:p>
+        </p:txBody>
+      </p:sp>
     </p:spTree>
   </p:cSld>
   <p:clrMapOvr>
@@ -10367,30 +10274,26 @@
           <a:lstStyle/>
           <a:p>
             <a:r>
-              <a:rPr lang="en-US" dirty="0" smtClean="0">
+              <a:rPr lang="en-US" dirty="0">
                 <a:latin typeface="Arial" pitchFamily="34" charset="0"/>
                 <a:cs typeface="Arial" pitchFamily="34" charset="0"/>
               </a:rPr>
               <a:t>Some </a:t>
             </a:r>
             <a:r>
-              <a:rPr lang="en-US" dirty="0" err="1" smtClean="0">
+              <a:rPr lang="en-US" dirty="0" err="1">
                 <a:latin typeface="Arial" pitchFamily="34" charset="0"/>
                 <a:cs typeface="Arial" pitchFamily="34" charset="0"/>
               </a:rPr>
               <a:t>datapoints</a:t>
             </a:r>
             <a:r>
-              <a:rPr lang="en-US" dirty="0" smtClean="0">
+              <a:rPr lang="en-US" dirty="0">
                 <a:latin typeface="Arial" pitchFamily="34" charset="0"/>
                 <a:cs typeface="Arial" pitchFamily="34" charset="0"/>
               </a:rPr>
               <a:t> are right on the model line and others are further away…</a:t>
             </a:r>
-            <a:endParaRPr lang="en-US" dirty="0">
-              <a:latin typeface="Arial" pitchFamily="34" charset="0"/>
-              <a:cs typeface="Arial" pitchFamily="34" charset="0"/>
-            </a:endParaRPr>
           </a:p>
         </p:txBody>
       </p:sp>
@@ -10474,12 +10377,12 @@
           <a:lstStyle/>
           <a:p>
             <a:r>
-              <a:rPr lang="en-US" dirty="0" smtClean="0"/>
+              <a:rPr lang="en-US" dirty="0"/>
               <a:t>In practice AIC and BIC tend to pretty similar…</a:t>
             </a:r>
           </a:p>
           <a:p>
-            <a:endParaRPr lang="en-US" dirty="0" smtClean="0"/>
+            <a:endParaRPr lang="en-US" dirty="0"/>
           </a:p>
           <a:p>
             <a:endParaRPr lang="en-US" dirty="0"/>
@@ -10509,14 +10412,13 @@
           <a:lstStyle/>
           <a:p>
             <a:r>
-              <a:rPr lang="en-US" dirty="0" smtClean="0"/>
+              <a:rPr lang="en-US" dirty="0"/>
               <a:t>We won’t be covering this literature </a:t>
             </a:r>
             <a:r>
-              <a:rPr lang="en-US" smtClean="0"/>
+              <a:rPr lang="en-US"/>
               <a:t>this semester…</a:t>
             </a:r>
-            <a:endParaRPr lang="en-US"/>
           </a:p>
         </p:txBody>
       </p:sp>
@@ -10542,10 +10444,9 @@
           <a:lstStyle/>
           <a:p>
             <a:r>
-              <a:rPr lang="en-US" dirty="0" smtClean="0"/>
+              <a:rPr lang="en-US" dirty="0"/>
               <a:t>http://en.wikipedia.org/wiki/Akaike_information_criterion</a:t>
             </a:r>
-            <a:endParaRPr lang="en-US" dirty="0"/>
           </a:p>
         </p:txBody>
       </p:sp>
@@ -10597,22 +10498,21 @@
           <a:lstStyle/>
           <a:p>
             <a:r>
-              <a:rPr lang="en-US" dirty="0" smtClean="0"/>
+              <a:rPr lang="en-US" dirty="0"/>
               <a:t>Next time:</a:t>
             </a:r>
           </a:p>
           <a:p>
             <a:r>
-              <a:rPr lang="en-US" dirty="0" smtClean="0"/>
+              <a:rPr lang="en-US" dirty="0"/>
               <a:t>	Linear models with multiple continuous variables.</a:t>
             </a:r>
           </a:p>
           <a:p>
             <a:r>
-              <a:rPr lang="en-US" dirty="0" smtClean="0"/>
+              <a:rPr lang="en-US" dirty="0"/>
               <a:t>	Ordination and PCA variables</a:t>
             </a:r>
-            <a:endParaRPr lang="en-US" dirty="0"/>
           </a:p>
         </p:txBody>
       </p:sp>
@@ -10621,13 +10521,6 @@
   <p:clrMapOvr>
     <a:masterClrMapping/>
   </p:clrMapOvr>
-  <p:timing>
-    <p:tnLst>
-      <p:par>
-        <p:cTn id="1" dur="indefinite" restart="never" nodeType="tmRoot"/>
-      </p:par>
-    </p:tnLst>
-  </p:timing>
 </p:sld>
 </file>
 
@@ -10702,42 +10595,42 @@
           </a:bodyPr>
           <a:lstStyle/>
           <a:p>
-            <a:endParaRPr lang="en-US" sz="1400" dirty="0" smtClean="0">
+            <a:endParaRPr lang="en-US" sz="1400" dirty="0">
               <a:latin typeface="Arial" pitchFamily="34" charset="0"/>
               <a:cs typeface="Arial" pitchFamily="34" charset="0"/>
             </a:endParaRPr>
           </a:p>
           <a:p>
             <a:r>
-              <a:rPr lang="en-US" sz="1400" dirty="0" err="1" smtClean="0">
+              <a:rPr lang="en-US" sz="1400" dirty="0" err="1">
                 <a:latin typeface="Arial" pitchFamily="34" charset="0"/>
                 <a:cs typeface="Arial" pitchFamily="34" charset="0"/>
               </a:rPr>
               <a:t>myT</a:t>
             </a:r>
             <a:r>
-              <a:rPr lang="en-US" sz="1400" dirty="0" smtClean="0">
+              <a:rPr lang="en-US" sz="1400" dirty="0">
                 <a:latin typeface="Arial" pitchFamily="34" charset="0"/>
                 <a:cs typeface="Arial" pitchFamily="34" charset="0"/>
               </a:rPr>
               <a:t> &lt;- </a:t>
             </a:r>
             <a:r>
-              <a:rPr lang="en-US" sz="1400" dirty="0" err="1" smtClean="0">
+              <a:rPr lang="en-US" sz="1400" dirty="0" err="1">
                 <a:latin typeface="Arial" pitchFamily="34" charset="0"/>
                 <a:cs typeface="Arial" pitchFamily="34" charset="0"/>
               </a:rPr>
               <a:t>read.table</a:t>
             </a:r>
             <a:r>
-              <a:rPr lang="en-US" sz="1400" dirty="0" smtClean="0">
+              <a:rPr lang="en-US" sz="1400" dirty="0">
                 <a:latin typeface="Arial" pitchFamily="34" charset="0"/>
                 <a:cs typeface="Arial" pitchFamily="34" charset="0"/>
               </a:rPr>
               <a:t>("qPCRWithSampleDays.txt", </a:t>
             </a:r>
             <a:r>
-              <a:rPr lang="en-US" sz="1400" u="sng" dirty="0" smtClean="0">
+              <a:rPr lang="en-US" sz="1400" u="sng" dirty="0">
                 <a:latin typeface="Arial" pitchFamily="34" charset="0"/>
                 <a:cs typeface="Arial" pitchFamily="34" charset="0"/>
               </a:rPr>
@@ -10746,49 +10639,49 @@
           </a:p>
           <a:p>
             <a:r>
-              <a:rPr lang="en-US" sz="1400" dirty="0" err="1" smtClean="0">
+              <a:rPr lang="en-US" sz="1400" dirty="0" err="1">
                 <a:latin typeface="Arial" pitchFamily="34" charset="0"/>
                 <a:cs typeface="Arial" pitchFamily="34" charset="0"/>
               </a:rPr>
               <a:t>myLm</a:t>
             </a:r>
             <a:r>
-              <a:rPr lang="en-US" sz="1400" dirty="0" smtClean="0">
+              <a:rPr lang="en-US" sz="1400" dirty="0">
                 <a:latin typeface="Arial" pitchFamily="34" charset="0"/>
                 <a:cs typeface="Arial" pitchFamily="34" charset="0"/>
               </a:rPr>
               <a:t> &lt;- </a:t>
             </a:r>
             <a:r>
-              <a:rPr lang="en-US" sz="1400" u="sng" dirty="0" smtClean="0">
+              <a:rPr lang="en-US" sz="1400" u="sng" dirty="0">
                 <a:latin typeface="Arial" pitchFamily="34" charset="0"/>
                 <a:cs typeface="Arial" pitchFamily="34" charset="0"/>
               </a:rPr>
               <a:t>lm( </a:t>
             </a:r>
             <a:r>
-              <a:rPr lang="en-US" sz="1400" u="sng" dirty="0" err="1" smtClean="0">
+              <a:rPr lang="en-US" sz="1400" u="sng" dirty="0" err="1">
                 <a:latin typeface="Arial" pitchFamily="34" charset="0"/>
                 <a:cs typeface="Arial" pitchFamily="34" charset="0"/>
               </a:rPr>
               <a:t>myT$LogBurk</a:t>
             </a:r>
             <a:r>
-              <a:rPr lang="en-US" sz="1400" u="sng" dirty="0" smtClean="0">
+              <a:rPr lang="en-US" sz="1400" u="sng" dirty="0">
                 <a:latin typeface="Arial" pitchFamily="34" charset="0"/>
                 <a:cs typeface="Arial" pitchFamily="34" charset="0"/>
               </a:rPr>
               <a:t>  ~ </a:t>
             </a:r>
             <a:r>
-              <a:rPr lang="en-US" sz="1400" u="sng" dirty="0" err="1" smtClean="0">
+              <a:rPr lang="en-US" sz="1400" u="sng" dirty="0" err="1">
                 <a:latin typeface="Arial" pitchFamily="34" charset="0"/>
                 <a:cs typeface="Arial" pitchFamily="34" charset="0"/>
               </a:rPr>
               <a:t>myT$sampleDays</a:t>
             </a:r>
             <a:r>
-              <a:rPr lang="en-US" sz="1400" u="sng" dirty="0" smtClean="0">
+              <a:rPr lang="en-US" sz="1400" u="sng" dirty="0">
                 <a:latin typeface="Arial" pitchFamily="34" charset="0"/>
                 <a:cs typeface="Arial" pitchFamily="34" charset="0"/>
               </a:rPr>
@@ -10797,35 +10690,35 @@
           </a:p>
           <a:p>
             <a:r>
-              <a:rPr lang="en-US" sz="1400" dirty="0" smtClean="0">
+              <a:rPr lang="en-US" sz="1400" dirty="0">
                 <a:latin typeface="Arial" pitchFamily="34" charset="0"/>
                 <a:cs typeface="Arial" pitchFamily="34" charset="0"/>
               </a:rPr>
               <a:t>plot( </a:t>
             </a:r>
             <a:r>
-              <a:rPr lang="en-US" sz="1400" dirty="0" err="1" smtClean="0">
+              <a:rPr lang="en-US" sz="1400" dirty="0" err="1">
                 <a:latin typeface="Arial" pitchFamily="34" charset="0"/>
                 <a:cs typeface="Arial" pitchFamily="34" charset="0"/>
               </a:rPr>
               <a:t>myT$sampleDays</a:t>
             </a:r>
             <a:r>
-              <a:rPr lang="en-US" sz="1400" dirty="0" smtClean="0">
+              <a:rPr lang="en-US" sz="1400" dirty="0">
                 <a:latin typeface="Arial" pitchFamily="34" charset="0"/>
                 <a:cs typeface="Arial" pitchFamily="34" charset="0"/>
               </a:rPr>
               <a:t> , </a:t>
             </a:r>
             <a:r>
-              <a:rPr lang="en-US" sz="1400" dirty="0" err="1" smtClean="0">
+              <a:rPr lang="en-US" sz="1400" dirty="0" err="1">
                 <a:latin typeface="Arial" pitchFamily="34" charset="0"/>
                 <a:cs typeface="Arial" pitchFamily="34" charset="0"/>
               </a:rPr>
               <a:t>myT$LogBurk</a:t>
             </a:r>
             <a:r>
-              <a:rPr lang="en-US" sz="1400" dirty="0" smtClean="0">
+              <a:rPr lang="en-US" sz="1400" dirty="0">
                 <a:latin typeface="Arial" pitchFamily="34" charset="0"/>
                 <a:cs typeface="Arial" pitchFamily="34" charset="0"/>
               </a:rPr>
@@ -10834,77 +10727,77 @@
           </a:p>
           <a:p>
             <a:r>
-              <a:rPr lang="en-US" sz="1400" dirty="0" smtClean="0">
+              <a:rPr lang="en-US" sz="1400" dirty="0">
                 <a:latin typeface="Arial" pitchFamily="34" charset="0"/>
                 <a:cs typeface="Arial" pitchFamily="34" charset="0"/>
               </a:rPr>
               <a:t>points( </a:t>
             </a:r>
             <a:r>
-              <a:rPr lang="en-US" sz="1400" dirty="0" err="1" smtClean="0">
+              <a:rPr lang="en-US" sz="1400" dirty="0" err="1">
                 <a:latin typeface="Arial" pitchFamily="34" charset="0"/>
                 <a:cs typeface="Arial" pitchFamily="34" charset="0"/>
               </a:rPr>
               <a:t>myT$sampleDays</a:t>
             </a:r>
             <a:r>
-              <a:rPr lang="en-US" sz="1400" dirty="0" smtClean="0">
+              <a:rPr lang="en-US" sz="1400" dirty="0">
                 <a:latin typeface="Arial" pitchFamily="34" charset="0"/>
                 <a:cs typeface="Arial" pitchFamily="34" charset="0"/>
               </a:rPr>
               <a:t>[1], </a:t>
             </a:r>
             <a:r>
-              <a:rPr lang="en-US" sz="1400" dirty="0" err="1" smtClean="0">
+              <a:rPr lang="en-US" sz="1400" dirty="0" err="1">
                 <a:latin typeface="Arial" pitchFamily="34" charset="0"/>
                 <a:cs typeface="Arial" pitchFamily="34" charset="0"/>
               </a:rPr>
               <a:t>myT$LogBurk</a:t>
             </a:r>
             <a:r>
-              <a:rPr lang="en-US" sz="1400" dirty="0" smtClean="0">
+              <a:rPr lang="en-US" sz="1400" dirty="0">
                 <a:latin typeface="Arial" pitchFamily="34" charset="0"/>
                 <a:cs typeface="Arial" pitchFamily="34" charset="0"/>
               </a:rPr>
               <a:t>[1], </a:t>
             </a:r>
             <a:r>
-              <a:rPr lang="en-US" sz="1400" u="sng" dirty="0" err="1" smtClean="0">
+              <a:rPr lang="en-US" sz="1400" u="sng" dirty="0" err="1">
                 <a:latin typeface="Arial" pitchFamily="34" charset="0"/>
                 <a:cs typeface="Arial" pitchFamily="34" charset="0"/>
               </a:rPr>
               <a:t>col</a:t>
             </a:r>
             <a:r>
-              <a:rPr lang="en-US" sz="1400" u="sng" dirty="0" smtClean="0">
+              <a:rPr lang="en-US" sz="1400" u="sng" dirty="0">
                 <a:latin typeface="Arial" pitchFamily="34" charset="0"/>
                 <a:cs typeface="Arial" pitchFamily="34" charset="0"/>
               </a:rPr>
               <a:t>="red", </a:t>
             </a:r>
             <a:r>
-              <a:rPr lang="en-US" sz="1400" u="sng" dirty="0" err="1" smtClean="0">
+              <a:rPr lang="en-US" sz="1400" u="sng" dirty="0" err="1">
                 <a:latin typeface="Arial" pitchFamily="34" charset="0"/>
                 <a:cs typeface="Arial" pitchFamily="34" charset="0"/>
               </a:rPr>
               <a:t>pch</a:t>
             </a:r>
             <a:r>
-              <a:rPr lang="en-US" sz="1400" u="sng" dirty="0" smtClean="0">
+              <a:rPr lang="en-US" sz="1400" u="sng" dirty="0">
                 <a:latin typeface="Arial" pitchFamily="34" charset="0"/>
                 <a:cs typeface="Arial" pitchFamily="34" charset="0"/>
               </a:rPr>
               <a:t>=15, </a:t>
             </a:r>
             <a:r>
-              <a:rPr lang="en-US" sz="1400" u="sng" dirty="0" err="1" smtClean="0">
+              <a:rPr lang="en-US" sz="1400" u="sng" dirty="0" err="1">
                 <a:latin typeface="Arial" pitchFamily="34" charset="0"/>
                 <a:cs typeface="Arial" pitchFamily="34" charset="0"/>
               </a:rPr>
               <a:t>cex</a:t>
             </a:r>
             <a:r>
-              <a:rPr lang="en-US" sz="1400" u="sng" dirty="0" smtClean="0">
+              <a:rPr lang="en-US" sz="1400" u="sng" dirty="0">
                 <a:latin typeface="Arial" pitchFamily="34" charset="0"/>
                 <a:cs typeface="Arial" pitchFamily="34" charset="0"/>
               </a:rPr>
@@ -10913,28 +10806,28 @@
           </a:p>
           <a:p>
             <a:r>
-              <a:rPr lang="en-US" sz="1400" u="sng" dirty="0" err="1" smtClean="0">
+              <a:rPr lang="en-US" sz="1400" u="sng" dirty="0" err="1">
                 <a:latin typeface="Arial" pitchFamily="34" charset="0"/>
                 <a:cs typeface="Arial" pitchFamily="34" charset="0"/>
               </a:rPr>
               <a:t>abline</a:t>
             </a:r>
             <a:r>
-              <a:rPr lang="en-US" sz="1400" u="sng" dirty="0" smtClean="0">
+              <a:rPr lang="en-US" sz="1400" u="sng" dirty="0">
                 <a:latin typeface="Arial" pitchFamily="34" charset="0"/>
                 <a:cs typeface="Arial" pitchFamily="34" charset="0"/>
               </a:rPr>
               <a:t>( </a:t>
             </a:r>
             <a:r>
-              <a:rPr lang="en-US" sz="1400" u="sng" dirty="0" err="1" smtClean="0">
+              <a:rPr lang="en-US" sz="1400" u="sng" dirty="0" err="1">
                 <a:latin typeface="Arial" pitchFamily="34" charset="0"/>
                 <a:cs typeface="Arial" pitchFamily="34" charset="0"/>
               </a:rPr>
               <a:t>myLm</a:t>
             </a:r>
             <a:r>
-              <a:rPr lang="en-US" sz="1400" u="sng" dirty="0" smtClean="0">
+              <a:rPr lang="en-US" sz="1400" u="sng" dirty="0">
                 <a:latin typeface="Arial" pitchFamily="34" charset="0"/>
                 <a:cs typeface="Arial" pitchFamily="34" charset="0"/>
               </a:rPr>
@@ -11027,35 +10920,35 @@
           </a:bodyPr>
           <a:lstStyle/>
           <a:p>
-            <a:endParaRPr lang="en-US" sz="1400" dirty="0" smtClean="0">
+            <a:endParaRPr lang="en-US" sz="1400" dirty="0">
               <a:latin typeface="Arial" pitchFamily="34" charset="0"/>
               <a:cs typeface="Arial" pitchFamily="34" charset="0"/>
             </a:endParaRPr>
           </a:p>
           <a:p>
             <a:r>
-              <a:rPr lang="en-US" sz="1400" dirty="0" smtClean="0">
+              <a:rPr lang="en-US" sz="1400" dirty="0">
                 <a:latin typeface="Arial" pitchFamily="34" charset="0"/>
                 <a:cs typeface="Arial" pitchFamily="34" charset="0"/>
               </a:rPr>
               <a:t>res = </a:t>
             </a:r>
             <a:r>
-              <a:rPr lang="en-US" sz="1400" u="sng" dirty="0" smtClean="0">
+              <a:rPr lang="en-US" sz="1400" u="sng" dirty="0">
                 <a:latin typeface="Arial" pitchFamily="34" charset="0"/>
                 <a:cs typeface="Arial" pitchFamily="34" charset="0"/>
               </a:rPr>
               <a:t>residuals(</a:t>
             </a:r>
             <a:r>
-              <a:rPr lang="en-US" sz="1400" u="sng" dirty="0" err="1" smtClean="0">
+              <a:rPr lang="en-US" sz="1400" u="sng" dirty="0" err="1">
                 <a:latin typeface="Arial" pitchFamily="34" charset="0"/>
                 <a:cs typeface="Arial" pitchFamily="34" charset="0"/>
               </a:rPr>
               <a:t>myLm</a:t>
             </a:r>
             <a:r>
-              <a:rPr lang="en-US" sz="1400" u="sng" dirty="0" smtClean="0">
+              <a:rPr lang="en-US" sz="1400" u="sng" dirty="0">
                 <a:latin typeface="Arial" pitchFamily="34" charset="0"/>
                 <a:cs typeface="Arial" pitchFamily="34" charset="0"/>
               </a:rPr>
@@ -11064,14 +10957,14 @@
           </a:p>
           <a:p>
             <a:r>
-              <a:rPr lang="en-US" sz="1400" u="sng" dirty="0" err="1" smtClean="0">
+              <a:rPr lang="en-US" sz="1400" u="sng" dirty="0" err="1">
                 <a:latin typeface="Arial" pitchFamily="34" charset="0"/>
                 <a:cs typeface="Arial" pitchFamily="34" charset="0"/>
               </a:rPr>
               <a:t>seqs</a:t>
             </a:r>
             <a:r>
-              <a:rPr lang="en-US" sz="1400" u="sng" dirty="0" smtClean="0">
+              <a:rPr lang="en-US" sz="1400" u="sng" dirty="0">
                 <a:latin typeface="Arial" pitchFamily="34" charset="0"/>
                 <a:cs typeface="Arial" pitchFamily="34" charset="0"/>
               </a:rPr>
@@ -11080,77 +10973,77 @@
           </a:p>
           <a:p>
             <a:r>
-              <a:rPr lang="en-US" sz="1400" dirty="0" smtClean="0">
+              <a:rPr lang="en-US" sz="1400" dirty="0">
                 <a:latin typeface="Arial" pitchFamily="34" charset="0"/>
                 <a:cs typeface="Arial" pitchFamily="34" charset="0"/>
               </a:rPr>
               <a:t>plot(</a:t>
             </a:r>
             <a:r>
-              <a:rPr lang="en-US" sz="1400" u="sng" dirty="0" err="1" smtClean="0">
+              <a:rPr lang="en-US" sz="1400" u="sng" dirty="0" err="1">
                 <a:latin typeface="Arial" pitchFamily="34" charset="0"/>
                 <a:cs typeface="Arial" pitchFamily="34" charset="0"/>
               </a:rPr>
               <a:t>seqs</a:t>
             </a:r>
             <a:r>
-              <a:rPr lang="en-US" sz="1400" u="sng" dirty="0" smtClean="0">
+              <a:rPr lang="en-US" sz="1400" u="sng" dirty="0">
                 <a:latin typeface="Arial" pitchFamily="34" charset="0"/>
                 <a:cs typeface="Arial" pitchFamily="34" charset="0"/>
               </a:rPr>
               <a:t>, </a:t>
             </a:r>
             <a:r>
-              <a:rPr lang="en-US" sz="1400" u="sng" dirty="0" err="1" smtClean="0">
+              <a:rPr lang="en-US" sz="1400" u="sng" dirty="0" err="1">
                 <a:latin typeface="Arial" pitchFamily="34" charset="0"/>
                 <a:cs typeface="Arial" pitchFamily="34" charset="0"/>
               </a:rPr>
               <a:t>dnorm</a:t>
             </a:r>
             <a:r>
-              <a:rPr lang="en-US" sz="1400" u="sng" dirty="0" smtClean="0">
+              <a:rPr lang="en-US" sz="1400" u="sng" dirty="0">
                 <a:latin typeface="Arial" pitchFamily="34" charset="0"/>
                 <a:cs typeface="Arial" pitchFamily="34" charset="0"/>
               </a:rPr>
               <a:t>(</a:t>
             </a:r>
             <a:r>
-              <a:rPr lang="en-US" sz="1400" u="sng" dirty="0" err="1" smtClean="0">
+              <a:rPr lang="en-US" sz="1400" u="sng" dirty="0" err="1">
                 <a:latin typeface="Arial" pitchFamily="34" charset="0"/>
                 <a:cs typeface="Arial" pitchFamily="34" charset="0"/>
               </a:rPr>
               <a:t>seqs,mean</a:t>
             </a:r>
             <a:r>
-              <a:rPr lang="en-US" sz="1400" u="sng" dirty="0" smtClean="0">
+              <a:rPr lang="en-US" sz="1400" u="sng" dirty="0">
                 <a:latin typeface="Arial" pitchFamily="34" charset="0"/>
                 <a:cs typeface="Arial" pitchFamily="34" charset="0"/>
               </a:rPr>
               <a:t>=mean(res), </a:t>
             </a:r>
             <a:r>
-              <a:rPr lang="en-US" sz="1400" u="sng" dirty="0" err="1" smtClean="0">
+              <a:rPr lang="en-US" sz="1400" u="sng" dirty="0" err="1">
                 <a:latin typeface="Arial" pitchFamily="34" charset="0"/>
                 <a:cs typeface="Arial" pitchFamily="34" charset="0"/>
               </a:rPr>
               <a:t>sd</a:t>
             </a:r>
             <a:r>
-              <a:rPr lang="en-US" sz="1400" u="sng" dirty="0" smtClean="0">
+              <a:rPr lang="en-US" sz="1400" u="sng" dirty="0">
                 <a:latin typeface="Arial" pitchFamily="34" charset="0"/>
                 <a:cs typeface="Arial" pitchFamily="34" charset="0"/>
               </a:rPr>
               <a:t> = </a:t>
             </a:r>
             <a:r>
-              <a:rPr lang="en-US" sz="1400" u="sng" dirty="0" err="1" smtClean="0">
+              <a:rPr lang="en-US" sz="1400" u="sng" dirty="0" err="1">
                 <a:latin typeface="Arial" pitchFamily="34" charset="0"/>
                 <a:cs typeface="Arial" pitchFamily="34" charset="0"/>
               </a:rPr>
               <a:t>sd</a:t>
             </a:r>
             <a:r>
-              <a:rPr lang="en-US" sz="1400" u="sng" dirty="0" smtClean="0">
+              <a:rPr lang="en-US" sz="1400" u="sng" dirty="0">
                 <a:latin typeface="Arial" pitchFamily="34" charset="0"/>
                 <a:cs typeface="Arial" pitchFamily="34" charset="0"/>
               </a:rPr>
@@ -11159,91 +11052,91 @@
           </a:p>
           <a:p>
             <a:r>
-              <a:rPr lang="en-US" sz="1400" dirty="0" smtClean="0">
+              <a:rPr lang="en-US" sz="1400" dirty="0">
                 <a:latin typeface="Arial" pitchFamily="34" charset="0"/>
                 <a:cs typeface="Arial" pitchFamily="34" charset="0"/>
               </a:rPr>
               <a:t>points( res[1], </a:t>
             </a:r>
             <a:r>
-              <a:rPr lang="en-US" sz="1400" u="sng" dirty="0" err="1" smtClean="0">
+              <a:rPr lang="en-US" sz="1400" u="sng" dirty="0" err="1">
                 <a:latin typeface="Arial" pitchFamily="34" charset="0"/>
                 <a:cs typeface="Arial" pitchFamily="34" charset="0"/>
               </a:rPr>
               <a:t>dnorm</a:t>
             </a:r>
             <a:r>
-              <a:rPr lang="en-US" sz="1400" u="sng" dirty="0" smtClean="0">
+              <a:rPr lang="en-US" sz="1400" u="sng" dirty="0">
                 <a:latin typeface="Arial" pitchFamily="34" charset="0"/>
                 <a:cs typeface="Arial" pitchFamily="34" charset="0"/>
               </a:rPr>
               <a:t>( res[1], mean=mean(res), </a:t>
             </a:r>
             <a:r>
-              <a:rPr lang="en-US" sz="1400" u="sng" dirty="0" err="1" smtClean="0">
+              <a:rPr lang="en-US" sz="1400" u="sng" dirty="0" err="1">
                 <a:latin typeface="Arial" pitchFamily="34" charset="0"/>
                 <a:cs typeface="Arial" pitchFamily="34" charset="0"/>
               </a:rPr>
               <a:t>sd</a:t>
             </a:r>
             <a:r>
-              <a:rPr lang="en-US" sz="1400" u="sng" dirty="0" smtClean="0">
+              <a:rPr lang="en-US" sz="1400" u="sng" dirty="0">
                 <a:latin typeface="Arial" pitchFamily="34" charset="0"/>
                 <a:cs typeface="Arial" pitchFamily="34" charset="0"/>
               </a:rPr>
               <a:t>=</a:t>
             </a:r>
             <a:r>
-              <a:rPr lang="en-US" sz="1400" u="sng" dirty="0" err="1" smtClean="0">
+              <a:rPr lang="en-US" sz="1400" u="sng" dirty="0" err="1">
                 <a:latin typeface="Arial" pitchFamily="34" charset="0"/>
                 <a:cs typeface="Arial" pitchFamily="34" charset="0"/>
               </a:rPr>
               <a:t>sd</a:t>
             </a:r>
             <a:r>
-              <a:rPr lang="en-US" sz="1400" u="sng" dirty="0" smtClean="0">
+              <a:rPr lang="en-US" sz="1400" u="sng" dirty="0">
                 <a:latin typeface="Arial" pitchFamily="34" charset="0"/>
                 <a:cs typeface="Arial" pitchFamily="34" charset="0"/>
               </a:rPr>
               <a:t>(res)), </a:t>
             </a:r>
             <a:r>
-              <a:rPr lang="en-US" sz="1400" u="sng" dirty="0" err="1" smtClean="0">
+              <a:rPr lang="en-US" sz="1400" u="sng" dirty="0" err="1">
                 <a:latin typeface="Arial" pitchFamily="34" charset="0"/>
                 <a:cs typeface="Arial" pitchFamily="34" charset="0"/>
               </a:rPr>
               <a:t>col</a:t>
             </a:r>
             <a:r>
-              <a:rPr lang="en-US" sz="1400" u="sng" dirty="0" smtClean="0">
+              <a:rPr lang="en-US" sz="1400" u="sng" dirty="0">
                 <a:latin typeface="Arial" pitchFamily="34" charset="0"/>
                 <a:cs typeface="Arial" pitchFamily="34" charset="0"/>
               </a:rPr>
               <a:t>="</a:t>
             </a:r>
             <a:r>
-              <a:rPr lang="en-US" sz="1400" u="sng" dirty="0" err="1" smtClean="0">
+              <a:rPr lang="en-US" sz="1400" u="sng" dirty="0" err="1">
                 <a:latin typeface="Arial" pitchFamily="34" charset="0"/>
                 <a:cs typeface="Arial" pitchFamily="34" charset="0"/>
               </a:rPr>
               <a:t>red",pch</a:t>
             </a:r>
             <a:r>
-              <a:rPr lang="en-US" sz="1400" u="sng" dirty="0" smtClean="0">
+              <a:rPr lang="en-US" sz="1400" u="sng" dirty="0">
                 <a:latin typeface="Arial" pitchFamily="34" charset="0"/>
                 <a:cs typeface="Arial" pitchFamily="34" charset="0"/>
               </a:rPr>
               <a:t>=15, </a:t>
             </a:r>
             <a:r>
-              <a:rPr lang="en-US" sz="1400" u="sng" dirty="0" err="1" smtClean="0">
+              <a:rPr lang="en-US" sz="1400" u="sng" dirty="0" err="1">
                 <a:latin typeface="Arial" pitchFamily="34" charset="0"/>
                 <a:cs typeface="Arial" pitchFamily="34" charset="0"/>
               </a:rPr>
               <a:t>cex</a:t>
             </a:r>
             <a:r>
-              <a:rPr lang="en-US" sz="1400" u="sng" dirty="0" smtClean="0">
+              <a:rPr lang="en-US" sz="1400" u="sng" dirty="0">
                 <a:latin typeface="Arial" pitchFamily="34" charset="0"/>
                 <a:cs typeface="Arial" pitchFamily="34" charset="0"/>
               </a:rPr>
@@ -11275,10 +11168,9 @@
           <a:lstStyle/>
           <a:p>
             <a:r>
-              <a:rPr lang="en-US" dirty="0" smtClean="0"/>
+              <a:rPr lang="en-US" dirty="0"/>
               <a:t>(to simplify, we only show one of the four model lines!)</a:t>
             </a:r>
-            <a:endParaRPr lang="en-US" dirty="0"/>
           </a:p>
         </p:txBody>
       </p:sp>
@@ -11394,42 +11286,42 @@
           </a:bodyPr>
           <a:lstStyle/>
           <a:p>
-            <a:endParaRPr lang="en-US" sz="1400" dirty="0" smtClean="0">
+            <a:endParaRPr lang="en-US" sz="1400" dirty="0">
               <a:latin typeface="Arial" pitchFamily="34" charset="0"/>
               <a:cs typeface="Arial" pitchFamily="34" charset="0"/>
             </a:endParaRPr>
           </a:p>
           <a:p>
             <a:r>
-              <a:rPr lang="en-US" sz="1400" dirty="0" err="1" smtClean="0">
+              <a:rPr lang="en-US" sz="1400" dirty="0" err="1">
                 <a:latin typeface="Arial" pitchFamily="34" charset="0"/>
                 <a:cs typeface="Arial" pitchFamily="34" charset="0"/>
               </a:rPr>
               <a:t>myT</a:t>
             </a:r>
             <a:r>
-              <a:rPr lang="en-US" sz="1400" dirty="0" smtClean="0">
+              <a:rPr lang="en-US" sz="1400" dirty="0">
                 <a:latin typeface="Arial" pitchFamily="34" charset="0"/>
                 <a:cs typeface="Arial" pitchFamily="34" charset="0"/>
               </a:rPr>
               <a:t> &lt;- </a:t>
             </a:r>
             <a:r>
-              <a:rPr lang="en-US" sz="1400" dirty="0" err="1" smtClean="0">
+              <a:rPr lang="en-US" sz="1400" dirty="0" err="1">
                 <a:latin typeface="Arial" pitchFamily="34" charset="0"/>
                 <a:cs typeface="Arial" pitchFamily="34" charset="0"/>
               </a:rPr>
               <a:t>read.table</a:t>
             </a:r>
             <a:r>
-              <a:rPr lang="en-US" sz="1400" dirty="0" smtClean="0">
+              <a:rPr lang="en-US" sz="1400" dirty="0">
                 <a:latin typeface="Arial" pitchFamily="34" charset="0"/>
                 <a:cs typeface="Arial" pitchFamily="34" charset="0"/>
               </a:rPr>
               <a:t>("qPCRWithSampleDays.txt", </a:t>
             </a:r>
             <a:r>
-              <a:rPr lang="en-US" sz="1400" u="sng" dirty="0" smtClean="0">
+              <a:rPr lang="en-US" sz="1400" u="sng" dirty="0">
                 <a:latin typeface="Arial" pitchFamily="34" charset="0"/>
                 <a:cs typeface="Arial" pitchFamily="34" charset="0"/>
               </a:rPr>
@@ -11438,49 +11330,49 @@
           </a:p>
           <a:p>
             <a:r>
-              <a:rPr lang="en-US" sz="1400" dirty="0" err="1" smtClean="0">
+              <a:rPr lang="en-US" sz="1400" dirty="0" err="1">
                 <a:latin typeface="Arial" pitchFamily="34" charset="0"/>
                 <a:cs typeface="Arial" pitchFamily="34" charset="0"/>
               </a:rPr>
               <a:t>myLm</a:t>
             </a:r>
             <a:r>
-              <a:rPr lang="en-US" sz="1400" dirty="0" smtClean="0">
+              <a:rPr lang="en-US" sz="1400" dirty="0">
                 <a:latin typeface="Arial" pitchFamily="34" charset="0"/>
                 <a:cs typeface="Arial" pitchFamily="34" charset="0"/>
               </a:rPr>
               <a:t> &lt;- </a:t>
             </a:r>
             <a:r>
-              <a:rPr lang="en-US" sz="1400" u="sng" dirty="0" smtClean="0">
+              <a:rPr lang="en-US" sz="1400" u="sng" dirty="0">
                 <a:latin typeface="Arial" pitchFamily="34" charset="0"/>
                 <a:cs typeface="Arial" pitchFamily="34" charset="0"/>
               </a:rPr>
               <a:t>lm( </a:t>
             </a:r>
             <a:r>
-              <a:rPr lang="en-US" sz="1400" u="sng" dirty="0" err="1" smtClean="0">
+              <a:rPr lang="en-US" sz="1400" u="sng" dirty="0" err="1">
                 <a:latin typeface="Arial" pitchFamily="34" charset="0"/>
                 <a:cs typeface="Arial" pitchFamily="34" charset="0"/>
               </a:rPr>
               <a:t>myT$LogBurk</a:t>
             </a:r>
             <a:r>
-              <a:rPr lang="en-US" sz="1400" u="sng" dirty="0" smtClean="0">
+              <a:rPr lang="en-US" sz="1400" u="sng" dirty="0">
                 <a:latin typeface="Arial" pitchFamily="34" charset="0"/>
                 <a:cs typeface="Arial" pitchFamily="34" charset="0"/>
               </a:rPr>
               <a:t>  ~ </a:t>
             </a:r>
             <a:r>
-              <a:rPr lang="en-US" sz="1400" u="sng" dirty="0" err="1" smtClean="0">
+              <a:rPr lang="en-US" sz="1400" u="sng" dirty="0" err="1">
                 <a:latin typeface="Arial" pitchFamily="34" charset="0"/>
                 <a:cs typeface="Arial" pitchFamily="34" charset="0"/>
               </a:rPr>
               <a:t>myT$sampleDays</a:t>
             </a:r>
             <a:r>
-              <a:rPr lang="en-US" sz="1400" u="sng" dirty="0" smtClean="0">
+              <a:rPr lang="en-US" sz="1400" u="sng" dirty="0">
                 <a:latin typeface="Arial" pitchFamily="34" charset="0"/>
                 <a:cs typeface="Arial" pitchFamily="34" charset="0"/>
               </a:rPr>
@@ -11489,35 +11381,35 @@
           </a:p>
           <a:p>
             <a:r>
-              <a:rPr lang="en-US" sz="1400" dirty="0" smtClean="0">
+              <a:rPr lang="en-US" sz="1400" dirty="0">
                 <a:latin typeface="Arial" pitchFamily="34" charset="0"/>
                 <a:cs typeface="Arial" pitchFamily="34" charset="0"/>
               </a:rPr>
               <a:t>plot( </a:t>
             </a:r>
             <a:r>
-              <a:rPr lang="en-US" sz="1400" dirty="0" err="1" smtClean="0">
+              <a:rPr lang="en-US" sz="1400" dirty="0" err="1">
                 <a:latin typeface="Arial" pitchFamily="34" charset="0"/>
                 <a:cs typeface="Arial" pitchFamily="34" charset="0"/>
               </a:rPr>
               <a:t>myT$sampleDays</a:t>
             </a:r>
             <a:r>
-              <a:rPr lang="en-US" sz="1400" dirty="0" smtClean="0">
+              <a:rPr lang="en-US" sz="1400" dirty="0">
                 <a:latin typeface="Arial" pitchFamily="34" charset="0"/>
                 <a:cs typeface="Arial" pitchFamily="34" charset="0"/>
               </a:rPr>
               <a:t> , </a:t>
             </a:r>
             <a:r>
-              <a:rPr lang="en-US" sz="1400" dirty="0" err="1" smtClean="0">
+              <a:rPr lang="en-US" sz="1400" dirty="0" err="1">
                 <a:latin typeface="Arial" pitchFamily="34" charset="0"/>
                 <a:cs typeface="Arial" pitchFamily="34" charset="0"/>
               </a:rPr>
               <a:t>myT$LogBurk</a:t>
             </a:r>
             <a:r>
-              <a:rPr lang="en-US" sz="1400" dirty="0" smtClean="0">
+              <a:rPr lang="en-US" sz="1400" dirty="0">
                 <a:latin typeface="Arial" pitchFamily="34" charset="0"/>
                 <a:cs typeface="Arial" pitchFamily="34" charset="0"/>
               </a:rPr>
@@ -11526,77 +11418,77 @@
           </a:p>
           <a:p>
             <a:r>
-              <a:rPr lang="en-US" sz="1400" dirty="0" smtClean="0">
+              <a:rPr lang="en-US" sz="1400" dirty="0">
                 <a:latin typeface="Arial" pitchFamily="34" charset="0"/>
                 <a:cs typeface="Arial" pitchFamily="34" charset="0"/>
               </a:rPr>
               <a:t>points( </a:t>
             </a:r>
             <a:r>
-              <a:rPr lang="en-US" sz="1400" dirty="0" err="1" smtClean="0">
+              <a:rPr lang="en-US" sz="1400" dirty="0" err="1">
                 <a:latin typeface="Arial" pitchFamily="34" charset="0"/>
                 <a:cs typeface="Arial" pitchFamily="34" charset="0"/>
               </a:rPr>
               <a:t>myT$sampleDays</a:t>
             </a:r>
             <a:r>
-              <a:rPr lang="en-US" sz="1400" dirty="0" smtClean="0">
+              <a:rPr lang="en-US" sz="1400" dirty="0">
                 <a:latin typeface="Arial" pitchFamily="34" charset="0"/>
                 <a:cs typeface="Arial" pitchFamily="34" charset="0"/>
               </a:rPr>
               <a:t>[17], </a:t>
             </a:r>
             <a:r>
-              <a:rPr lang="en-US" sz="1400" dirty="0" err="1" smtClean="0">
+              <a:rPr lang="en-US" sz="1400" dirty="0" err="1">
                 <a:latin typeface="Arial" pitchFamily="34" charset="0"/>
                 <a:cs typeface="Arial" pitchFamily="34" charset="0"/>
               </a:rPr>
               <a:t>myT$LogBurk</a:t>
             </a:r>
             <a:r>
-              <a:rPr lang="en-US" sz="1400" dirty="0" smtClean="0">
+              <a:rPr lang="en-US" sz="1400" dirty="0">
                 <a:latin typeface="Arial" pitchFamily="34" charset="0"/>
                 <a:cs typeface="Arial" pitchFamily="34" charset="0"/>
               </a:rPr>
               <a:t>[17], </a:t>
             </a:r>
             <a:r>
-              <a:rPr lang="en-US" sz="1400" u="sng" dirty="0" err="1" smtClean="0">
+              <a:rPr lang="en-US" sz="1400" u="sng" dirty="0" err="1">
                 <a:latin typeface="Arial" pitchFamily="34" charset="0"/>
                 <a:cs typeface="Arial" pitchFamily="34" charset="0"/>
               </a:rPr>
               <a:t>col</a:t>
             </a:r>
             <a:r>
-              <a:rPr lang="en-US" sz="1400" u="sng" dirty="0" smtClean="0">
+              <a:rPr lang="en-US" sz="1400" u="sng" dirty="0">
                 <a:latin typeface="Arial" pitchFamily="34" charset="0"/>
                 <a:cs typeface="Arial" pitchFamily="34" charset="0"/>
               </a:rPr>
               <a:t>="red", </a:t>
             </a:r>
             <a:r>
-              <a:rPr lang="en-US" sz="1400" u="sng" dirty="0" err="1" smtClean="0">
+              <a:rPr lang="en-US" sz="1400" u="sng" dirty="0" err="1">
                 <a:latin typeface="Arial" pitchFamily="34" charset="0"/>
                 <a:cs typeface="Arial" pitchFamily="34" charset="0"/>
               </a:rPr>
               <a:t>pch</a:t>
             </a:r>
             <a:r>
-              <a:rPr lang="en-US" sz="1400" u="sng" dirty="0" smtClean="0">
+              <a:rPr lang="en-US" sz="1400" u="sng" dirty="0">
                 <a:latin typeface="Arial" pitchFamily="34" charset="0"/>
                 <a:cs typeface="Arial" pitchFamily="34" charset="0"/>
               </a:rPr>
               <a:t>=15, </a:t>
             </a:r>
             <a:r>
-              <a:rPr lang="en-US" sz="1400" u="sng" dirty="0" err="1" smtClean="0">
+              <a:rPr lang="en-US" sz="1400" u="sng" dirty="0" err="1">
                 <a:latin typeface="Arial" pitchFamily="34" charset="0"/>
                 <a:cs typeface="Arial" pitchFamily="34" charset="0"/>
               </a:rPr>
               <a:t>cex</a:t>
             </a:r>
             <a:r>
-              <a:rPr lang="en-US" sz="1400" u="sng" dirty="0" smtClean="0">
+              <a:rPr lang="en-US" sz="1400" u="sng" dirty="0">
                 <a:latin typeface="Arial" pitchFamily="34" charset="0"/>
                 <a:cs typeface="Arial" pitchFamily="34" charset="0"/>
               </a:rPr>
@@ -11605,28 +11497,28 @@
           </a:p>
           <a:p>
             <a:r>
-              <a:rPr lang="en-US" sz="1400" u="sng" dirty="0" err="1" smtClean="0">
+              <a:rPr lang="en-US" sz="1400" u="sng" dirty="0" err="1">
                 <a:latin typeface="Arial" pitchFamily="34" charset="0"/>
                 <a:cs typeface="Arial" pitchFamily="34" charset="0"/>
               </a:rPr>
               <a:t>abline</a:t>
             </a:r>
             <a:r>
-              <a:rPr lang="en-US" sz="1400" u="sng" dirty="0" smtClean="0">
+              <a:rPr lang="en-US" sz="1400" u="sng" dirty="0">
                 <a:latin typeface="Arial" pitchFamily="34" charset="0"/>
                 <a:cs typeface="Arial" pitchFamily="34" charset="0"/>
               </a:rPr>
               <a:t>( </a:t>
             </a:r>
             <a:r>
-              <a:rPr lang="en-US" sz="1400" u="sng" dirty="0" err="1" smtClean="0">
+              <a:rPr lang="en-US" sz="1400" u="sng" dirty="0" err="1">
                 <a:latin typeface="Arial" pitchFamily="34" charset="0"/>
                 <a:cs typeface="Arial" pitchFamily="34" charset="0"/>
               </a:rPr>
               <a:t>myLm</a:t>
             </a:r>
             <a:r>
-              <a:rPr lang="en-US" sz="1400" u="sng" dirty="0" smtClean="0">
+              <a:rPr lang="en-US" sz="1400" u="sng" dirty="0">
                 <a:latin typeface="Arial" pitchFamily="34" charset="0"/>
                 <a:cs typeface="Arial" pitchFamily="34" charset="0"/>
               </a:rPr>
@@ -11686,42 +11578,42 @@
           </a:bodyPr>
           <a:lstStyle/>
           <a:p>
-            <a:endParaRPr lang="en-US" sz="1400" dirty="0" smtClean="0">
+            <a:endParaRPr lang="en-US" sz="1400" dirty="0">
               <a:latin typeface="Arial" pitchFamily="34" charset="0"/>
               <a:cs typeface="Arial" pitchFamily="34" charset="0"/>
             </a:endParaRPr>
           </a:p>
           <a:p>
             <a:r>
-              <a:rPr lang="en-US" sz="1400" dirty="0" err="1" smtClean="0">
+              <a:rPr lang="en-US" sz="1400" dirty="0" err="1">
                 <a:latin typeface="Arial" pitchFamily="34" charset="0"/>
                 <a:cs typeface="Arial" pitchFamily="34" charset="0"/>
               </a:rPr>
               <a:t>myT</a:t>
             </a:r>
             <a:r>
-              <a:rPr lang="en-US" sz="1400" dirty="0" smtClean="0">
+              <a:rPr lang="en-US" sz="1400" dirty="0">
                 <a:latin typeface="Arial" pitchFamily="34" charset="0"/>
                 <a:cs typeface="Arial" pitchFamily="34" charset="0"/>
               </a:rPr>
               <a:t> &lt;- </a:t>
             </a:r>
             <a:r>
-              <a:rPr lang="en-US" sz="1400" dirty="0" err="1" smtClean="0">
+              <a:rPr lang="en-US" sz="1400" dirty="0" err="1">
                 <a:latin typeface="Arial" pitchFamily="34" charset="0"/>
                 <a:cs typeface="Arial" pitchFamily="34" charset="0"/>
               </a:rPr>
               <a:t>read.table</a:t>
             </a:r>
             <a:r>
-              <a:rPr lang="en-US" sz="1400" dirty="0" smtClean="0">
+              <a:rPr lang="en-US" sz="1400" dirty="0">
                 <a:latin typeface="Arial" pitchFamily="34" charset="0"/>
                 <a:cs typeface="Arial" pitchFamily="34" charset="0"/>
               </a:rPr>
               <a:t>("qPCRWithSampleDays.txt", </a:t>
             </a:r>
             <a:r>
-              <a:rPr lang="en-US" sz="1400" u="sng" dirty="0" smtClean="0">
+              <a:rPr lang="en-US" sz="1400" u="sng" dirty="0">
                 <a:latin typeface="Arial" pitchFamily="34" charset="0"/>
                 <a:cs typeface="Arial" pitchFamily="34" charset="0"/>
               </a:rPr>
@@ -11730,49 +11622,49 @@
           </a:p>
           <a:p>
             <a:r>
-              <a:rPr lang="en-US" sz="1400" dirty="0" err="1" smtClean="0">
+              <a:rPr lang="en-US" sz="1400" dirty="0" err="1">
                 <a:latin typeface="Arial" pitchFamily="34" charset="0"/>
                 <a:cs typeface="Arial" pitchFamily="34" charset="0"/>
               </a:rPr>
               <a:t>myLm</a:t>
             </a:r>
             <a:r>
-              <a:rPr lang="en-US" sz="1400" dirty="0" smtClean="0">
+              <a:rPr lang="en-US" sz="1400" dirty="0">
                 <a:latin typeface="Arial" pitchFamily="34" charset="0"/>
                 <a:cs typeface="Arial" pitchFamily="34" charset="0"/>
               </a:rPr>
               <a:t> &lt;- </a:t>
             </a:r>
             <a:r>
-              <a:rPr lang="en-US" sz="1400" u="sng" dirty="0" smtClean="0">
+              <a:rPr lang="en-US" sz="1400" u="sng" dirty="0">
                 <a:latin typeface="Arial" pitchFamily="34" charset="0"/>
                 <a:cs typeface="Arial" pitchFamily="34" charset="0"/>
               </a:rPr>
               <a:t>lm( </a:t>
             </a:r>
             <a:r>
-              <a:rPr lang="en-US" sz="1400" u="sng" dirty="0" err="1" smtClean="0">
+              <a:rPr lang="en-US" sz="1400" u="sng" dirty="0" err="1">
                 <a:latin typeface="Arial" pitchFamily="34" charset="0"/>
                 <a:cs typeface="Arial" pitchFamily="34" charset="0"/>
               </a:rPr>
               <a:t>myT$LogBurk</a:t>
             </a:r>
             <a:r>
-              <a:rPr lang="en-US" sz="1400" u="sng" dirty="0" smtClean="0">
+              <a:rPr lang="en-US" sz="1400" u="sng" dirty="0">
                 <a:latin typeface="Arial" pitchFamily="34" charset="0"/>
                 <a:cs typeface="Arial" pitchFamily="34" charset="0"/>
               </a:rPr>
               <a:t>  ~ </a:t>
             </a:r>
             <a:r>
-              <a:rPr lang="en-US" sz="1400" u="sng" dirty="0" err="1" smtClean="0">
+              <a:rPr lang="en-US" sz="1400" u="sng" dirty="0" err="1">
                 <a:latin typeface="Arial" pitchFamily="34" charset="0"/>
                 <a:cs typeface="Arial" pitchFamily="34" charset="0"/>
               </a:rPr>
               <a:t>myT$sampleDays</a:t>
             </a:r>
             <a:r>
-              <a:rPr lang="en-US" sz="1400" u="sng" dirty="0" smtClean="0">
+              <a:rPr lang="en-US" sz="1400" u="sng" dirty="0">
                 <a:latin typeface="Arial" pitchFamily="34" charset="0"/>
                 <a:cs typeface="Arial" pitchFamily="34" charset="0"/>
               </a:rPr>
@@ -11781,35 +11673,35 @@
           </a:p>
           <a:p>
             <a:r>
-              <a:rPr lang="en-US" sz="1400" dirty="0" smtClean="0">
+              <a:rPr lang="en-US" sz="1400" dirty="0">
                 <a:latin typeface="Arial" pitchFamily="34" charset="0"/>
                 <a:cs typeface="Arial" pitchFamily="34" charset="0"/>
               </a:rPr>
               <a:t>plot( </a:t>
             </a:r>
             <a:r>
-              <a:rPr lang="en-US" sz="1400" dirty="0" err="1" smtClean="0">
+              <a:rPr lang="en-US" sz="1400" dirty="0" err="1">
                 <a:latin typeface="Arial" pitchFamily="34" charset="0"/>
                 <a:cs typeface="Arial" pitchFamily="34" charset="0"/>
               </a:rPr>
               <a:t>myT$sampleDays</a:t>
             </a:r>
             <a:r>
-              <a:rPr lang="en-US" sz="1400" dirty="0" smtClean="0">
+              <a:rPr lang="en-US" sz="1400" dirty="0">
                 <a:latin typeface="Arial" pitchFamily="34" charset="0"/>
                 <a:cs typeface="Arial" pitchFamily="34" charset="0"/>
               </a:rPr>
               <a:t> , </a:t>
             </a:r>
             <a:r>
-              <a:rPr lang="en-US" sz="1400" dirty="0" err="1" smtClean="0">
+              <a:rPr lang="en-US" sz="1400" dirty="0" err="1">
                 <a:latin typeface="Arial" pitchFamily="34" charset="0"/>
                 <a:cs typeface="Arial" pitchFamily="34" charset="0"/>
               </a:rPr>
               <a:t>myT$LogBurk</a:t>
             </a:r>
             <a:r>
-              <a:rPr lang="en-US" sz="1400" dirty="0" smtClean="0">
+              <a:rPr lang="en-US" sz="1400" dirty="0">
                 <a:latin typeface="Arial" pitchFamily="34" charset="0"/>
                 <a:cs typeface="Arial" pitchFamily="34" charset="0"/>
               </a:rPr>
@@ -11818,77 +11710,77 @@
           </a:p>
           <a:p>
             <a:r>
-              <a:rPr lang="en-US" sz="1400" dirty="0" smtClean="0">
+              <a:rPr lang="en-US" sz="1400" dirty="0">
                 <a:latin typeface="Arial" pitchFamily="34" charset="0"/>
                 <a:cs typeface="Arial" pitchFamily="34" charset="0"/>
               </a:rPr>
               <a:t>points( </a:t>
             </a:r>
             <a:r>
-              <a:rPr lang="en-US" sz="1400" dirty="0" err="1" smtClean="0">
+              <a:rPr lang="en-US" sz="1400" dirty="0" err="1">
                 <a:latin typeface="Arial" pitchFamily="34" charset="0"/>
                 <a:cs typeface="Arial" pitchFamily="34" charset="0"/>
               </a:rPr>
               <a:t>myT$sampleDays</a:t>
             </a:r>
             <a:r>
-              <a:rPr lang="en-US" sz="1400" dirty="0" smtClean="0">
+              <a:rPr lang="en-US" sz="1400" dirty="0">
                 <a:latin typeface="Arial" pitchFamily="34" charset="0"/>
                 <a:cs typeface="Arial" pitchFamily="34" charset="0"/>
               </a:rPr>
               <a:t>[17], </a:t>
             </a:r>
             <a:r>
-              <a:rPr lang="en-US" sz="1400" dirty="0" err="1" smtClean="0">
+              <a:rPr lang="en-US" sz="1400" dirty="0" err="1">
                 <a:latin typeface="Arial" pitchFamily="34" charset="0"/>
                 <a:cs typeface="Arial" pitchFamily="34" charset="0"/>
               </a:rPr>
               <a:t>myT$LogBurk</a:t>
             </a:r>
             <a:r>
-              <a:rPr lang="en-US" sz="1400" dirty="0" smtClean="0">
+              <a:rPr lang="en-US" sz="1400" dirty="0">
                 <a:latin typeface="Arial" pitchFamily="34" charset="0"/>
                 <a:cs typeface="Arial" pitchFamily="34" charset="0"/>
               </a:rPr>
               <a:t>[17], </a:t>
             </a:r>
             <a:r>
-              <a:rPr lang="en-US" sz="1400" u="sng" dirty="0" err="1" smtClean="0">
+              <a:rPr lang="en-US" sz="1400" u="sng" dirty="0" err="1">
                 <a:latin typeface="Arial" pitchFamily="34" charset="0"/>
                 <a:cs typeface="Arial" pitchFamily="34" charset="0"/>
               </a:rPr>
               <a:t>col</a:t>
             </a:r>
             <a:r>
-              <a:rPr lang="en-US" sz="1400" u="sng" dirty="0" smtClean="0">
+              <a:rPr lang="en-US" sz="1400" u="sng" dirty="0">
                 <a:latin typeface="Arial" pitchFamily="34" charset="0"/>
                 <a:cs typeface="Arial" pitchFamily="34" charset="0"/>
               </a:rPr>
               <a:t>="red", </a:t>
             </a:r>
             <a:r>
-              <a:rPr lang="en-US" sz="1400" u="sng" dirty="0" err="1" smtClean="0">
+              <a:rPr lang="en-US" sz="1400" u="sng" dirty="0" err="1">
                 <a:latin typeface="Arial" pitchFamily="34" charset="0"/>
                 <a:cs typeface="Arial" pitchFamily="34" charset="0"/>
               </a:rPr>
               <a:t>pch</a:t>
             </a:r>
             <a:r>
-              <a:rPr lang="en-US" sz="1400" u="sng" dirty="0" smtClean="0">
+              <a:rPr lang="en-US" sz="1400" u="sng" dirty="0">
                 <a:latin typeface="Arial" pitchFamily="34" charset="0"/>
                 <a:cs typeface="Arial" pitchFamily="34" charset="0"/>
               </a:rPr>
               <a:t>=15, </a:t>
             </a:r>
             <a:r>
-              <a:rPr lang="en-US" sz="1400" u="sng" dirty="0" err="1" smtClean="0">
+              <a:rPr lang="en-US" sz="1400" u="sng" dirty="0" err="1">
                 <a:latin typeface="Arial" pitchFamily="34" charset="0"/>
                 <a:cs typeface="Arial" pitchFamily="34" charset="0"/>
               </a:rPr>
               <a:t>cex</a:t>
             </a:r>
             <a:r>
-              <a:rPr lang="en-US" sz="1400" u="sng" dirty="0" smtClean="0">
+              <a:rPr lang="en-US" sz="1400" u="sng" dirty="0">
                 <a:latin typeface="Arial" pitchFamily="34" charset="0"/>
                 <a:cs typeface="Arial" pitchFamily="34" charset="0"/>
               </a:rPr>
@@ -11897,28 +11789,28 @@
           </a:p>
           <a:p>
             <a:r>
-              <a:rPr lang="en-US" sz="1400" u="sng" dirty="0" err="1" smtClean="0">
+              <a:rPr lang="en-US" sz="1400" u="sng" dirty="0" err="1">
                 <a:latin typeface="Arial" pitchFamily="34" charset="0"/>
                 <a:cs typeface="Arial" pitchFamily="34" charset="0"/>
               </a:rPr>
               <a:t>abline</a:t>
             </a:r>
             <a:r>
-              <a:rPr lang="en-US" sz="1400" u="sng" dirty="0" smtClean="0">
+              <a:rPr lang="en-US" sz="1400" u="sng" dirty="0">
                 <a:latin typeface="Arial" pitchFamily="34" charset="0"/>
                 <a:cs typeface="Arial" pitchFamily="34" charset="0"/>
               </a:rPr>
               <a:t>( </a:t>
             </a:r>
             <a:r>
-              <a:rPr lang="en-US" sz="1400" u="sng" dirty="0" err="1" smtClean="0">
+              <a:rPr lang="en-US" sz="1400" u="sng" dirty="0" err="1">
                 <a:latin typeface="Arial" pitchFamily="34" charset="0"/>
                 <a:cs typeface="Arial" pitchFamily="34" charset="0"/>
               </a:rPr>
               <a:t>myLm</a:t>
             </a:r>
             <a:r>
-              <a:rPr lang="en-US" sz="1400" u="sng" dirty="0" smtClean="0">
+              <a:rPr lang="en-US" sz="1400" u="sng" dirty="0">
                 <a:latin typeface="Arial" pitchFamily="34" charset="0"/>
                 <a:cs typeface="Arial" pitchFamily="34" charset="0"/>
               </a:rPr>
@@ -11950,16 +11842,15 @@
           <a:lstStyle/>
           <a:p>
             <a:r>
-              <a:rPr lang="en-US" dirty="0" smtClean="0"/>
+              <a:rPr lang="en-US" dirty="0"/>
               <a:t>We can fit models by finding parameters that maximize the likelihood</a:t>
             </a:r>
           </a:p>
           <a:p>
             <a:r>
-              <a:rPr lang="en-US" dirty="0" smtClean="0"/>
+              <a:rPr lang="en-US" dirty="0"/>
               <a:t>(more on that later…)</a:t>
             </a:r>
-            <a:endParaRPr lang="en-US" dirty="0"/>
           </a:p>
         </p:txBody>
       </p:sp>
@@ -12043,10 +11934,9 @@
           <a:lstStyle/>
           <a:p>
             <a:r>
-              <a:rPr lang="en-US" dirty="0" smtClean="0"/>
+              <a:rPr lang="en-US" dirty="0"/>
               <a:t>R has a built in function that will make this calculation for us…</a:t>
             </a:r>
-            <a:endParaRPr lang="en-US" dirty="0"/>
           </a:p>
         </p:txBody>
       </p:sp>
@@ -12098,22 +11988,21 @@
           <a:lstStyle/>
           <a:p>
             <a:r>
-              <a:rPr lang="en-US" dirty="0" smtClean="0"/>
+              <a:rPr lang="en-US" dirty="0"/>
               <a:t>Calculating the likelihood of models</a:t>
             </a:r>
           </a:p>
           <a:p>
             <a:r>
-              <a:rPr lang="en-US" dirty="0" smtClean="0"/>
+              <a:rPr lang="en-US" dirty="0"/>
               <a:t>Linear models with higher exponential terms</a:t>
             </a:r>
           </a:p>
           <a:p>
             <a:r>
-              <a:rPr lang="en-US" dirty="0" smtClean="0"/>
+              <a:rPr lang="en-US" dirty="0"/>
               <a:t>AIC criteria</a:t>
             </a:r>
-            <a:endParaRPr lang="en-US" dirty="0"/>
           </a:p>
         </p:txBody>
       </p:sp>
@@ -12198,18 +12087,17 @@
           <a:lstStyle/>
           <a:p>
             <a:r>
-              <a:rPr lang="en-US" dirty="0" smtClean="0"/>
+              <a:rPr lang="en-US" dirty="0"/>
               <a:t>Another </a:t>
             </a:r>
             <a:r>
-              <a:rPr lang="en-US" dirty="0" err="1" smtClean="0"/>
+              <a:rPr lang="en-US" dirty="0" err="1"/>
               <a:t>taxa</a:t>
             </a:r>
             <a:r>
-              <a:rPr lang="en-US" dirty="0" smtClean="0"/>
+              <a:rPr lang="en-US" dirty="0"/>
               <a:t> (Pseudomonas) clearly does not meet the assumption of linearity….</a:t>
             </a:r>
-            <a:endParaRPr lang="en-US" dirty="0"/>
           </a:p>
         </p:txBody>
       </p:sp>
@@ -12314,13 +12202,6 @@
   <p:clrMapOvr>
     <a:masterClrMapping/>
   </p:clrMapOvr>
-  <p:timing>
-    <p:tnLst>
-      <p:par>
-        <p:cTn id="1" dur="indefinite" restart="never" nodeType="tmRoot"/>
-      </p:par>
-    </p:tnLst>
-  </p:timing>
 </p:sld>
 </file>
 

</xml_diff>